<commit_message>
Final changes during R3
</commit_message>
<xml_diff>
--- a/results/figures and tables/Template_flow_chart.pptx
+++ b/results/figures and tables/Template_flow_chart.pptx
@@ -243,7 +243,7 @@
           <a:p>
             <a:fld id="{4C92642D-ECBE-41AC-83D0-C345ABFBAA16}" type="datetimeFigureOut">
               <a:rPr lang="en-US" smtClean="0"/>
-              <a:t>8/23/2021</a:t>
+              <a:t>4/21/2022</a:t>
             </a:fld>
             <a:endParaRPr lang="en-US"/>
           </a:p>
@@ -413,7 +413,7 @@
           <a:p>
             <a:fld id="{4C92642D-ECBE-41AC-83D0-C345ABFBAA16}" type="datetimeFigureOut">
               <a:rPr lang="en-US" smtClean="0"/>
-              <a:t>8/23/2021</a:t>
+              <a:t>4/21/2022</a:t>
             </a:fld>
             <a:endParaRPr lang="en-US"/>
           </a:p>
@@ -593,7 +593,7 @@
           <a:p>
             <a:fld id="{4C92642D-ECBE-41AC-83D0-C345ABFBAA16}" type="datetimeFigureOut">
               <a:rPr lang="en-US" smtClean="0"/>
-              <a:t>8/23/2021</a:t>
+              <a:t>4/21/2022</a:t>
             </a:fld>
             <a:endParaRPr lang="en-US"/>
           </a:p>
@@ -763,7 +763,7 @@
           <a:p>
             <a:fld id="{4C92642D-ECBE-41AC-83D0-C345ABFBAA16}" type="datetimeFigureOut">
               <a:rPr lang="en-US" smtClean="0"/>
-              <a:t>8/23/2021</a:t>
+              <a:t>4/21/2022</a:t>
             </a:fld>
             <a:endParaRPr lang="en-US"/>
           </a:p>
@@ -1007,7 +1007,7 @@
           <a:p>
             <a:fld id="{4C92642D-ECBE-41AC-83D0-C345ABFBAA16}" type="datetimeFigureOut">
               <a:rPr lang="en-US" smtClean="0"/>
-              <a:t>8/23/2021</a:t>
+              <a:t>4/21/2022</a:t>
             </a:fld>
             <a:endParaRPr lang="en-US"/>
           </a:p>
@@ -1239,7 +1239,7 @@
           <a:p>
             <a:fld id="{4C92642D-ECBE-41AC-83D0-C345ABFBAA16}" type="datetimeFigureOut">
               <a:rPr lang="en-US" smtClean="0"/>
-              <a:t>8/23/2021</a:t>
+              <a:t>4/21/2022</a:t>
             </a:fld>
             <a:endParaRPr lang="en-US"/>
           </a:p>
@@ -1606,7 +1606,7 @@
           <a:p>
             <a:fld id="{4C92642D-ECBE-41AC-83D0-C345ABFBAA16}" type="datetimeFigureOut">
               <a:rPr lang="en-US" smtClean="0"/>
-              <a:t>8/23/2021</a:t>
+              <a:t>4/21/2022</a:t>
             </a:fld>
             <a:endParaRPr lang="en-US"/>
           </a:p>
@@ -1724,7 +1724,7 @@
           <a:p>
             <a:fld id="{4C92642D-ECBE-41AC-83D0-C345ABFBAA16}" type="datetimeFigureOut">
               <a:rPr lang="en-US" smtClean="0"/>
-              <a:t>8/23/2021</a:t>
+              <a:t>4/21/2022</a:t>
             </a:fld>
             <a:endParaRPr lang="en-US"/>
           </a:p>
@@ -1819,7 +1819,7 @@
           <a:p>
             <a:fld id="{4C92642D-ECBE-41AC-83D0-C345ABFBAA16}" type="datetimeFigureOut">
               <a:rPr lang="en-US" smtClean="0"/>
-              <a:t>8/23/2021</a:t>
+              <a:t>4/21/2022</a:t>
             </a:fld>
             <a:endParaRPr lang="en-US"/>
           </a:p>
@@ -2096,7 +2096,7 @@
           <a:p>
             <a:fld id="{4C92642D-ECBE-41AC-83D0-C345ABFBAA16}" type="datetimeFigureOut">
               <a:rPr lang="en-US" smtClean="0"/>
-              <a:t>8/23/2021</a:t>
+              <a:t>4/21/2022</a:t>
             </a:fld>
             <a:endParaRPr lang="en-US"/>
           </a:p>
@@ -2353,7 +2353,7 @@
           <a:p>
             <a:fld id="{4C92642D-ECBE-41AC-83D0-C345ABFBAA16}" type="datetimeFigureOut">
               <a:rPr lang="en-US" smtClean="0"/>
-              <a:t>8/23/2021</a:t>
+              <a:t>4/21/2022</a:t>
             </a:fld>
             <a:endParaRPr lang="en-US"/>
           </a:p>
@@ -2566,7 +2566,7 @@
           <a:p>
             <a:fld id="{4C92642D-ECBE-41AC-83D0-C345ABFBAA16}" type="datetimeFigureOut">
               <a:rPr lang="en-US" smtClean="0"/>
-              <a:t>8/23/2021</a:t>
+              <a:t>4/21/2022</a:t>
             </a:fld>
             <a:endParaRPr lang="en-US"/>
           </a:p>
@@ -2986,14 +2986,14 @@
           <p:nvPr>
             <p:extLst>
               <p:ext uri="{D42A27DB-BD31-4B8C-83A1-F6EECF244321}">
-                <p14:modId xmlns:p14="http://schemas.microsoft.com/office/powerpoint/2010/main" val="2807185409"/>
+                <p14:modId xmlns:p14="http://schemas.microsoft.com/office/powerpoint/2010/main" val="2075684926"/>
               </p:ext>
             </p:extLst>
           </p:nvPr>
         </p:nvGraphicFramePr>
         <p:xfrm>
-          <a:off x="156431" y="225654"/>
-          <a:ext cx="5850828" cy="7232414"/>
+          <a:off x="156431" y="87114"/>
+          <a:ext cx="5850828" cy="7374902"/>
         </p:xfrm>
         <a:graphic>
           <a:graphicData uri="http://schemas.openxmlformats.org/drawingml/2006/table">
@@ -5169,7 +5169,7 @@
                     <a:lstStyle/>
                     <a:p>
                       <a:pPr algn="ctr"/>
-                      <a:endParaRPr lang="en-US" sz="1050"/>
+                      <a:endParaRPr lang="en-US" sz="1050" dirty="0"/>
                     </a:p>
                   </a:txBody>
                   <a:tcPr marL="79295" marR="79295" marT="39648" marB="39648" anchor="ctr">
@@ -5182,8 +5182,14 @@
                     <a:lnT w="12700" cmpd="sng">
                       <a:noFill/>
                     </a:lnT>
-                    <a:lnB w="12700" cmpd="sng">
-                      <a:noFill/>
+                    <a:lnB w="12700" cap="flat" cmpd="sng" algn="ctr">
+                      <a:solidFill>
+                        <a:schemeClr val="tx1"/>
+                      </a:solidFill>
+                      <a:prstDash val="solid"/>
+                      <a:round/>
+                      <a:headEnd type="none" w="med" len="med"/>
+                      <a:tailEnd type="none" w="med" len="med"/>
                     </a:lnB>
                     <a:lnTlToBr w="12700" cmpd="sng">
                       <a:noFill/>
@@ -5201,7 +5207,19 @@
                     <a:lstStyle/>
                     <a:p>
                       <a:pPr algn="ctr"/>
-                      <a:endParaRPr lang="en-US" sz="1800"/>
+                      <a:r>
+                        <a:rPr lang="en-US" sz="1800" kern="1200" dirty="0">
+                          <a:solidFill>
+                            <a:schemeClr val="tx1"/>
+                          </a:solidFill>
+                          <a:effectLst/>
+                          <a:latin typeface="+mn-lt"/>
+                          <a:ea typeface="+mn-ea"/>
+                          <a:cs typeface="+mn-cs"/>
+                        </a:rPr>
+                        <a:t>↙</a:t>
+                      </a:r>
+                      <a:endParaRPr lang="en-US" sz="1800" dirty="0"/>
                     </a:p>
                   </a:txBody>
                   <a:tcPr marL="79295" marR="79295" marT="39648" marB="39648" anchor="ctr">
@@ -5592,8 +5610,14 @@
                       <a:headEnd type="none" w="med" len="med"/>
                       <a:tailEnd type="none" w="med" len="med"/>
                     </a:lnL>
-                    <a:lnR w="12700" cmpd="sng">
-                      <a:noFill/>
+                    <a:lnR w="12700" cap="flat" cmpd="sng" algn="ctr">
+                      <a:solidFill>
+                        <a:schemeClr val="tx1"/>
+                      </a:solidFill>
+                      <a:prstDash val="solid"/>
+                      <a:round/>
+                      <a:headEnd type="none" w="med" len="med"/>
+                      <a:tailEnd type="none" w="med" len="med"/>
                     </a:lnR>
                     <a:lnT w="12700" cmpd="sng">
                       <a:noFill/>
@@ -5617,21 +5641,48 @@
                     <a:lstStyle/>
                     <a:p>
                       <a:pPr algn="ctr"/>
-                      <a:endParaRPr lang="en-US" sz="1050"/>
-                    </a:p>
-                  </a:txBody>
-                  <a:tcPr marL="79295" marR="79295" marT="39648" marB="39648" anchor="ctr">
-                    <a:lnL w="12700" cmpd="sng">
-                      <a:noFill/>
-                    </a:lnL>
-                    <a:lnR w="12700" cmpd="sng">
-                      <a:noFill/>
-                    </a:lnR>
-                    <a:lnT w="12700" cmpd="sng">
-                      <a:noFill/>
-                    </a:lnT>
-                    <a:lnB w="12700" cmpd="sng">
-                      <a:noFill/>
+                      <a:r>
+                        <a:rPr lang="en-US" sz="1050" dirty="0"/>
+                        <a:t>Info. complete for 23 publications </a:t>
+                      </a:r>
+                    </a:p>
+                  </a:txBody>
+                  <a:tcPr marL="79295" marR="79295" marT="39648" marB="39648" anchor="ctr">
+                    <a:lnL w="12700" cap="flat" cmpd="sng" algn="ctr">
+                      <a:solidFill>
+                        <a:schemeClr val="tx1"/>
+                      </a:solidFill>
+                      <a:prstDash val="solid"/>
+                      <a:round/>
+                      <a:headEnd type="none" w="med" len="med"/>
+                      <a:tailEnd type="none" w="med" len="med"/>
+                    </a:lnL>
+                    <a:lnR w="12700" cap="flat" cmpd="sng" algn="ctr">
+                      <a:solidFill>
+                        <a:schemeClr val="tx1"/>
+                      </a:solidFill>
+                      <a:prstDash val="solid"/>
+                      <a:round/>
+                      <a:headEnd type="none" w="med" len="med"/>
+                      <a:tailEnd type="none" w="med" len="med"/>
+                    </a:lnR>
+                    <a:lnT w="12700" cap="flat" cmpd="sng" algn="ctr">
+                      <a:solidFill>
+                        <a:schemeClr val="tx1"/>
+                      </a:solidFill>
+                      <a:prstDash val="solid"/>
+                      <a:round/>
+                      <a:headEnd type="none" w="med" len="med"/>
+                      <a:tailEnd type="none" w="med" len="med"/>
+                    </a:lnT>
+                    <a:lnB w="12700" cap="flat" cmpd="sng" algn="ctr">
+                      <a:solidFill>
+                        <a:schemeClr val="tx1"/>
+                      </a:solidFill>
+                      <a:prstDash val="solid"/>
+                      <a:round/>
+                      <a:headEnd type="none" w="med" len="med"/>
+                      <a:tailEnd type="none" w="med" len="med"/>
                     </a:lnB>
                     <a:lnTlToBr w="12700" cmpd="sng">
                       <a:noFill/>
@@ -5653,8 +5704,14 @@
                     </a:p>
                   </a:txBody>
                   <a:tcPr marL="79295" marR="79295" marT="39648" marB="39648" anchor="ctr">
-                    <a:lnL w="12700" cmpd="sng">
-                      <a:noFill/>
+                    <a:lnL w="12700" cap="flat" cmpd="sng" algn="ctr">
+                      <a:solidFill>
+                        <a:schemeClr val="tx1"/>
+                      </a:solidFill>
+                      <a:prstDash val="solid"/>
+                      <a:round/>
+                      <a:headEnd type="none" w="med" len="med"/>
+                      <a:tailEnd type="none" w="med" len="med"/>
                     </a:lnL>
                     <a:lnR w="12700" cap="flat" cmpd="sng" algn="ctr">
                       <a:solidFill>
@@ -5746,7 +5803,7 @@
                     <a:lstStyle/>
                     <a:p>
                       <a:pPr algn="ctr"/>
-                      <a:endParaRPr lang="en-US" sz="1800"/>
+                      <a:endParaRPr lang="en-US" sz="1800" dirty="0"/>
                     </a:p>
                   </a:txBody>
                   <a:tcPr marL="79295" marR="79295" marT="39648" marB="39648" anchor="ctr">
@@ -5949,7 +6006,7 @@
                     <a:lstStyle/>
                     <a:p>
                       <a:pPr algn="ctr"/>
-                      <a:endParaRPr lang="en-US" sz="1050"/>
+                      <a:endParaRPr lang="en-US" sz="1050" dirty="0"/>
                     </a:p>
                   </a:txBody>
                   <a:tcPr marL="79295" marR="79295" marT="39648" marB="39648" anchor="ctr">
@@ -5959,8 +6016,14 @@
                     <a:lnR w="12700" cmpd="sng">
                       <a:noFill/>
                     </a:lnR>
-                    <a:lnT w="12700" cmpd="sng">
-                      <a:noFill/>
+                    <a:lnT w="12700" cap="flat" cmpd="sng" algn="ctr">
+                      <a:solidFill>
+                        <a:schemeClr val="tx1"/>
+                      </a:solidFill>
+                      <a:prstDash val="solid"/>
+                      <a:round/>
+                      <a:headEnd type="none" w="med" len="med"/>
+                      <a:tailEnd type="none" w="med" len="med"/>
                     </a:lnT>
                     <a:lnB w="12700" cmpd="sng">
                       <a:noFill/>
@@ -6101,7 +6164,7 @@
                     <a:lstStyle/>
                     <a:p>
                       <a:pPr algn="ctr"/>
-                      <a:endParaRPr lang="en-US" sz="1050"/>
+                      <a:endParaRPr lang="en-US" sz="1050" dirty="0"/>
                     </a:p>
                   </a:txBody>
                   <a:tcPr marL="79295" marR="79295" marT="39648" marB="39648" anchor="ctr">
@@ -6306,7 +6369,7 @@
                   </a:ext>
                 </a:extLst>
               </a:tr>
-              <a:tr h="404131">
+              <a:tr h="304515">
                 <a:tc vMerge="1">
                   <a:txBody>
                     <a:bodyPr/>
@@ -6407,7 +6470,7 @@
                     <a:lstStyle/>
                     <a:p>
                       <a:pPr algn="ctr"/>
-                      <a:endParaRPr lang="en-US" sz="1050"/>
+                      <a:endParaRPr lang="en-US" sz="1050" dirty="0"/>
                     </a:p>
                   </a:txBody>
                   <a:tcPr marL="79295" marR="79295" marT="39648" marB="39648" anchor="ctr">
@@ -6471,7 +6534,7 @@
                     </a:lnBlToTr>
                   </a:tcPr>
                 </a:tc>
-                <a:tc>
+                <a:tc rowSpan="3">
                   <a:txBody>
                     <a:bodyPr/>
                     <a:lstStyle/>
@@ -6479,9 +6542,30 @@
                       <a:pPr algn="ctr"/>
                       <a:r>
                         <a:rPr lang="en-US" sz="1050" dirty="0"/>
-                        <a:t>314 corresponding authors contacted</a:t>
+                        <a:t>Data requests for 460 publications</a:t>
                       </a:r>
                     </a:p>
+                    <a:p>
+                      <a:pPr algn="ctr"/>
+                      <a:r>
+                        <a:rPr lang="en-US" sz="1050" dirty="0"/>
+                        <a:t>(314 corresponding authors contacted;</a:t>
+                      </a:r>
+                    </a:p>
+                    <a:p>
+                      <a:pPr algn="ctr"/>
+                      <a:r>
+                        <a:rPr lang="en-US" sz="1050" dirty="0"/>
+                        <a:t>144 responded;</a:t>
+                      </a:r>
+                    </a:p>
+                    <a:p>
+                      <a:pPr algn="ctr"/>
+                      <a:r>
+                        <a:rPr lang="en-US" sz="1050" dirty="0"/>
+                        <a:t>118 provided data)</a:t>
+                      </a:r>
+                    </a:p>
                   </a:txBody>
                   <a:tcPr marL="79295" marR="79295" marT="39648" marB="39648" anchor="ctr">
                     <a:lnL w="12700" cap="flat" cmpd="sng" algn="ctr">
@@ -6493,6 +6577,44 @@
                       <a:headEnd type="none" w="med" len="med"/>
                       <a:tailEnd type="none" w="med" len="med"/>
                     </a:lnL>
+                    <a:lnT w="12700" cap="flat" cmpd="sng" algn="ctr">
+                      <a:solidFill>
+                        <a:schemeClr val="tx1"/>
+                      </a:solidFill>
+                      <a:prstDash val="solid"/>
+                      <a:round/>
+                      <a:headEnd type="none" w="med" len="med"/>
+                      <a:tailEnd type="none" w="med" len="med"/>
+                    </a:lnT>
+                    <a:lnB w="12700" cap="flat" cmpd="sng" algn="ctr">
+                      <a:solidFill>
+                        <a:schemeClr val="tx1"/>
+                      </a:solidFill>
+                      <a:prstDash val="solid"/>
+                      <a:round/>
+                      <a:headEnd type="none" w="med" len="med"/>
+                      <a:tailEnd type="none" w="med" len="med"/>
+                    </a:lnB>
+                    <a:lnTlToBr w="12700" cmpd="sng">
+                      <a:noFill/>
+                      <a:prstDash val="solid"/>
+                    </a:lnTlToBr>
+                    <a:lnBlToTr w="12700" cmpd="sng">
+                      <a:noFill/>
+                      <a:prstDash val="solid"/>
+                    </a:lnBlToTr>
+                  </a:tcPr>
+                </a:tc>
+                <a:tc>
+                  <a:txBody>
+                    <a:bodyPr/>
+                    <a:lstStyle/>
+                    <a:p>
+                      <a:pPr algn="ctr"/>
+                      <a:endParaRPr lang="en-US" sz="1800"/>
+                    </a:p>
+                  </a:txBody>
+                  <a:tcPr marL="79295" marR="79295" marT="39648" marB="39648" anchor="ctr">
                     <a:lnR w="12700" cap="flat" cmpd="sng" algn="ctr">
                       <a:solidFill>
                         <a:schemeClr val="tx1"/>
@@ -6502,62 +6624,6 @@
                       <a:headEnd type="none" w="med" len="med"/>
                       <a:tailEnd type="none" w="med" len="med"/>
                     </a:lnR>
-                    <a:lnT w="12700" cap="flat" cmpd="sng" algn="ctr">
-                      <a:solidFill>
-                        <a:schemeClr val="tx1"/>
-                      </a:solidFill>
-                      <a:prstDash val="solid"/>
-                      <a:round/>
-                      <a:headEnd type="none" w="med" len="med"/>
-                      <a:tailEnd type="none" w="med" len="med"/>
-                    </a:lnT>
-                    <a:lnB w="12700" cap="flat" cmpd="sng" algn="ctr">
-                      <a:solidFill>
-                        <a:schemeClr val="tx1"/>
-                      </a:solidFill>
-                      <a:prstDash val="solid"/>
-                      <a:round/>
-                      <a:headEnd type="none" w="med" len="med"/>
-                      <a:tailEnd type="none" w="med" len="med"/>
-                    </a:lnB>
-                    <a:lnTlToBr w="12700" cmpd="sng">
-                      <a:noFill/>
-                      <a:prstDash val="solid"/>
-                    </a:lnTlToBr>
-                    <a:lnBlToTr w="12700" cmpd="sng">
-                      <a:noFill/>
-                      <a:prstDash val="solid"/>
-                    </a:lnBlToTr>
-                  </a:tcPr>
-                </a:tc>
-                <a:tc>
-                  <a:txBody>
-                    <a:bodyPr/>
-                    <a:lstStyle/>
-                    <a:p>
-                      <a:pPr algn="ctr"/>
-                      <a:endParaRPr lang="en-US" sz="1800"/>
-                    </a:p>
-                  </a:txBody>
-                  <a:tcPr marL="79295" marR="79295" marT="39648" marB="39648" anchor="ctr">
-                    <a:lnL w="12700" cap="flat" cmpd="sng" algn="ctr">
-                      <a:solidFill>
-                        <a:schemeClr val="tx1"/>
-                      </a:solidFill>
-                      <a:prstDash val="solid"/>
-                      <a:round/>
-                      <a:headEnd type="none" w="med" len="med"/>
-                      <a:tailEnd type="none" w="med" len="med"/>
-                    </a:lnL>
-                    <a:lnR w="12700" cap="flat" cmpd="sng" algn="ctr">
-                      <a:solidFill>
-                        <a:schemeClr val="tx1"/>
-                      </a:solidFill>
-                      <a:prstDash val="solid"/>
-                      <a:round/>
-                      <a:headEnd type="none" w="med" len="med"/>
-                      <a:tailEnd type="none" w="med" len="med"/>
-                    </a:lnR>
                     <a:lnT w="12700" cmpd="sng">
                       <a:noFill/>
                     </a:lnT>
@@ -6578,6 +6644,17 @@
                   <a:txBody>
                     <a:bodyPr/>
                     <a:lstStyle/>
+                    <a:p>
+                      <a:pPr algn="ctr"/>
+                      <a:r>
+                        <a:rPr lang="en-US" sz="1050" dirty="0"/>
+                        <a:t>Data requests unsuccessful for 297 publications</a:t>
+                      </a:r>
+                    </a:p>
+                    <a:p>
+                      <a:pPr algn="ctr"/>
+                      <a:endParaRPr lang="en-US" sz="1050" dirty="0"/>
+                    </a:p>
                     <a:p>
                       <a:pPr algn="ctr"/>
                       <a:r>
@@ -6727,7 +6804,7 @@
                   </a:ext>
                 </a:extLst>
               </a:tr>
-              <a:tr h="357862">
+              <a:tr h="353616">
                 <a:tc vMerge="1">
                   <a:txBody>
                     <a:bodyPr/>
@@ -6737,7 +6814,11 @@
                       <a:endParaRPr lang="en-US" sz="800" dirty="0"/>
                     </a:p>
                   </a:txBody>
-                  <a:tcPr marL="79295" marR="79295" marT="39648" marB="39648" vert="vert270" anchor="ctr"/>
+                  <a:tcPr marL="79295" marR="79295" marT="39648" marB="39648" vert="vert270" anchor="ctr">
+                    <a:lnT w="12700" cmpd="sng">
+                      <a:noFill/>
+                    </a:lnT>
+                  </a:tcPr>
                 </a:tc>
                 <a:tc>
                   <a:txBody>
@@ -6749,6 +6830,105 @@
                     </a:p>
                   </a:txBody>
                   <a:tcPr marL="79295" marR="79295" marT="39648" marB="39648" anchor="ctr">
+                    <a:lnR w="12700" cmpd="sng">
+                      <a:noFill/>
+                    </a:lnR>
+                    <a:lnT w="12700" cmpd="sng">
+                      <a:noFill/>
+                    </a:lnT>
+                    <a:lnB w="12700" cmpd="sng">
+                      <a:noFill/>
+                    </a:lnB>
+                    <a:lnTlToBr w="12700" cmpd="sng">
+                      <a:noFill/>
+                      <a:prstDash val="solid"/>
+                    </a:lnTlToBr>
+                    <a:lnBlToTr w="12700" cmpd="sng">
+                      <a:noFill/>
+                      <a:prstDash val="solid"/>
+                    </a:lnBlToTr>
+                  </a:tcPr>
+                </a:tc>
+                <a:tc>
+                  <a:txBody>
+                    <a:bodyPr/>
+                    <a:lstStyle/>
+                    <a:p>
+                      <a:pPr algn="ctr"/>
+                      <a:endParaRPr lang="en-US" sz="1050" dirty="0"/>
+                    </a:p>
+                  </a:txBody>
+                  <a:tcPr marL="79295" marR="79295" marT="39648" marB="39648" anchor="ctr">
+                    <a:lnL w="12700" cmpd="sng">
+                      <a:noFill/>
+                    </a:lnL>
+                    <a:lnR w="12700" cmpd="sng">
+                      <a:noFill/>
+                    </a:lnR>
+                    <a:lnT w="12700" cmpd="sng">
+                      <a:noFill/>
+                    </a:lnT>
+                    <a:lnB w="12700" cmpd="sng">
+                      <a:noFill/>
+                    </a:lnB>
+                    <a:lnTlToBr w="12700" cmpd="sng">
+                      <a:noFill/>
+                      <a:prstDash val="solid"/>
+                    </a:lnTlToBr>
+                    <a:lnBlToTr w="12700" cmpd="sng">
+                      <a:noFill/>
+                      <a:prstDash val="solid"/>
+                    </a:lnBlToTr>
+                  </a:tcPr>
+                </a:tc>
+                <a:tc>
+                  <a:txBody>
+                    <a:bodyPr/>
+                    <a:lstStyle/>
+                    <a:p>
+                      <a:pPr algn="ctr"/>
+                      <a:endParaRPr lang="en-US" sz="1800"/>
+                    </a:p>
+                  </a:txBody>
+                  <a:tcPr marL="79295" marR="79295" marT="39648" marB="39648" anchor="ctr">
+                    <a:lnL w="12700" cmpd="sng">
+                      <a:noFill/>
+                    </a:lnL>
+                    <a:lnR w="12700" cap="flat" cmpd="sng" algn="ctr">
+                      <a:solidFill>
+                        <a:schemeClr val="tx1"/>
+                      </a:solidFill>
+                      <a:prstDash val="solid"/>
+                      <a:round/>
+                      <a:headEnd type="none" w="med" len="med"/>
+                      <a:tailEnd type="none" w="med" len="med"/>
+                    </a:lnR>
+                    <a:lnT w="12700" cmpd="sng">
+                      <a:noFill/>
+                    </a:lnT>
+                    <a:lnB w="12700" cmpd="sng">
+                      <a:noFill/>
+                    </a:lnB>
+                    <a:lnTlToBr w="12700" cmpd="sng">
+                      <a:noFill/>
+                      <a:prstDash val="solid"/>
+                    </a:lnTlToBr>
+                    <a:lnBlToTr w="12700" cmpd="sng">
+                      <a:noFill/>
+                      <a:prstDash val="solid"/>
+                    </a:lnBlToTr>
+                  </a:tcPr>
+                </a:tc>
+                <a:tc vMerge="1">
+                  <a:txBody>
+                    <a:bodyPr/>
+                    <a:lstStyle/>
+                    <a:p>
+                      <a:pPr algn="ctr"/>
+                      <a:endParaRPr lang="en-US" sz="1800" dirty="0"/>
+                    </a:p>
+                  </a:txBody>
+                  <a:tcPr marL="79295" marR="79295" marT="39648" marB="39648" anchor="ctr">
                     <a:lnL w="12700" cap="flat" cmpd="sng" algn="ctr">
                       <a:solidFill>
                         <a:schemeClr val="tx1"/>
@@ -6758,6 +6938,126 @@
                       <a:headEnd type="none" w="med" len="med"/>
                       <a:tailEnd type="none" w="med" len="med"/>
                     </a:lnL>
+                    <a:lnR w="12700" cap="flat" cmpd="sng" algn="ctr">
+                      <a:solidFill>
+                        <a:schemeClr val="tx1"/>
+                      </a:solidFill>
+                      <a:prstDash val="solid"/>
+                      <a:round/>
+                      <a:headEnd type="none" w="med" len="med"/>
+                      <a:tailEnd type="none" w="med" len="med"/>
+                    </a:lnR>
+                    <a:lnT w="12700" cap="flat" cmpd="sng" algn="ctr">
+                      <a:noFill/>
+                      <a:prstDash val="solid"/>
+                      <a:round/>
+                      <a:headEnd type="none" w="med" len="med"/>
+                      <a:tailEnd type="none" w="med" len="med"/>
+                    </a:lnT>
+                    <a:lnB w="12700" cap="flat" cmpd="sng" algn="ctr">
+                      <a:noFill/>
+                      <a:prstDash val="solid"/>
+                      <a:round/>
+                      <a:headEnd type="none" w="med" len="med"/>
+                      <a:tailEnd type="none" w="med" len="med"/>
+                    </a:lnB>
+                    <a:lnTlToBr w="12700" cmpd="sng">
+                      <a:noFill/>
+                      <a:prstDash val="solid"/>
+                    </a:lnTlToBr>
+                    <a:lnBlToTr w="12700" cmpd="sng">
+                      <a:noFill/>
+                      <a:prstDash val="solid"/>
+                    </a:lnBlToTr>
+                  </a:tcPr>
+                </a:tc>
+                <a:tc>
+                  <a:txBody>
+                    <a:bodyPr/>
+                    <a:lstStyle/>
+                    <a:p>
+                      <a:pPr algn="ctr"/>
+                      <a:r>
+                        <a:rPr lang="en-US" sz="1800" dirty="0"/>
+                        <a:t>→</a:t>
+                      </a:r>
+                    </a:p>
+                  </a:txBody>
+                  <a:tcPr marL="79295" marR="79295" marT="39648" marB="39648" anchor="ctr">
+                    <a:lnL w="12700" cap="flat" cmpd="sng" algn="ctr">
+                      <a:solidFill>
+                        <a:schemeClr val="tx1"/>
+                      </a:solidFill>
+                      <a:prstDash val="solid"/>
+                      <a:round/>
+                      <a:headEnd type="none" w="med" len="med"/>
+                      <a:tailEnd type="none" w="med" len="med"/>
+                    </a:lnL>
+                    <a:lnR w="12700" cap="flat" cmpd="sng" algn="ctr">
+                      <a:solidFill>
+                        <a:schemeClr val="tx1"/>
+                      </a:solidFill>
+                      <a:prstDash val="solid"/>
+                      <a:round/>
+                      <a:headEnd type="none" w="med" len="med"/>
+                      <a:tailEnd type="none" w="med" len="med"/>
+                    </a:lnR>
+                    <a:lnT w="12700" cmpd="sng">
+                      <a:noFill/>
+                    </a:lnT>
+                    <a:lnB w="12700" cmpd="sng">
+                      <a:noFill/>
+                    </a:lnB>
+                    <a:lnTlToBr w="12700" cmpd="sng">
+                      <a:noFill/>
+                      <a:prstDash val="solid"/>
+                    </a:lnTlToBr>
+                    <a:lnBlToTr w="12700" cmpd="sng">
+                      <a:noFill/>
+                      <a:prstDash val="solid"/>
+                    </a:lnBlToTr>
+                  </a:tcPr>
+                </a:tc>
+                <a:tc vMerge="1">
+                  <a:txBody>
+                    <a:bodyPr/>
+                    <a:lstStyle/>
+                    <a:p>
+                      <a:pPr algn="ctr"/>
+                      <a:endParaRPr lang="en-US" sz="800"/>
+                    </a:p>
+                  </a:txBody>
+                  <a:tcPr marL="79295" marR="79295" marT="39648" marB="39648" anchor="ctr">
+                    <a:lnL w="12700" cap="flat" cmpd="sng" algn="ctr">
+                      <a:solidFill>
+                        <a:schemeClr val="tx1"/>
+                      </a:solidFill>
+                      <a:prstDash val="solid"/>
+                      <a:round/>
+                      <a:headEnd type="none" w="med" len="med"/>
+                      <a:tailEnd type="none" w="med" len="med"/>
+                    </a:lnL>
+                    <a:lnT w="12700" cap="flat" cmpd="sng" algn="ctr">
+                      <a:solidFill>
+                        <a:schemeClr val="tx1"/>
+                      </a:solidFill>
+                      <a:prstDash val="solid"/>
+                      <a:round/>
+                      <a:headEnd type="none" w="med" len="med"/>
+                      <a:tailEnd type="none" w="med" len="med"/>
+                    </a:lnT>
+                  </a:tcPr>
+                </a:tc>
+                <a:tc>
+                  <a:txBody>
+                    <a:bodyPr/>
+                    <a:lstStyle/>
+                    <a:p>
+                      <a:pPr algn="ctr"/>
+                      <a:endParaRPr lang="en-US" sz="1050" dirty="0"/>
+                    </a:p>
+                  </a:txBody>
+                  <a:tcPr marL="79295" marR="79295" marT="39648" marB="39648" anchor="ctr">
                     <a:lnR w="12700" cmpd="sng">
                       <a:noFill/>
                     </a:lnR>
@@ -6777,6 +7077,28 @@
                     </a:lnBlToTr>
                   </a:tcPr>
                 </a:tc>
+                <a:extLst>
+                  <a:ext uri="{0D108BD9-81ED-4DB2-BD59-A6C34878D82A}">
+                    <a16:rowId xmlns:a16="http://schemas.microsoft.com/office/drawing/2014/main" val="1399668982"/>
+                  </a:ext>
+                </a:extLst>
+              </a:tr>
+              <a:tr h="357863">
+                <a:tc vMerge="1">
+                  <a:txBody>
+                    <a:bodyPr/>
+                    <a:lstStyle/>
+                    <a:p>
+                      <a:pPr algn="ctr"/>
+                      <a:endParaRPr lang="en-US" sz="800" dirty="0"/>
+                    </a:p>
+                  </a:txBody>
+                  <a:tcPr marL="79295" marR="79295" marT="39648" marB="39648" vert="vert270" anchor="ctr">
+                    <a:lnT w="12700" cmpd="sng">
+                      <a:noFill/>
+                    </a:lnT>
+                  </a:tcPr>
+                </a:tc>
                 <a:tc>
                   <a:txBody>
                     <a:bodyPr/>
@@ -6787,6 +7109,35 @@
                     </a:p>
                   </a:txBody>
                   <a:tcPr marL="79295" marR="79295" marT="39648" marB="39648" anchor="ctr">
+                    <a:lnR w="12700" cmpd="sng">
+                      <a:noFill/>
+                    </a:lnR>
+                    <a:lnT w="12700" cmpd="sng">
+                      <a:noFill/>
+                    </a:lnT>
+                    <a:lnB w="12700" cmpd="sng">
+                      <a:noFill/>
+                    </a:lnB>
+                    <a:lnTlToBr w="12700" cmpd="sng">
+                      <a:noFill/>
+                      <a:prstDash val="solid"/>
+                    </a:lnTlToBr>
+                    <a:lnBlToTr w="12700" cmpd="sng">
+                      <a:noFill/>
+                      <a:prstDash val="solid"/>
+                    </a:lnBlToTr>
+                  </a:tcPr>
+                </a:tc>
+                <a:tc>
+                  <a:txBody>
+                    <a:bodyPr/>
+                    <a:lstStyle/>
+                    <a:p>
+                      <a:pPr algn="ctr"/>
+                      <a:endParaRPr lang="en-US" sz="1050" dirty="0"/>
+                    </a:p>
+                  </a:txBody>
+                  <a:tcPr marL="79295" marR="79295" marT="39648" marB="39648" anchor="ctr">
                     <a:lnL w="12700" cmpd="sng">
                       <a:noFill/>
                     </a:lnL>
@@ -6822,6 +7173,172 @@
                     <a:lnL w="12700" cmpd="sng">
                       <a:noFill/>
                     </a:lnL>
+                    <a:lnR w="12700" cap="flat" cmpd="sng" algn="ctr">
+                      <a:solidFill>
+                        <a:schemeClr val="tx1"/>
+                      </a:solidFill>
+                      <a:prstDash val="solid"/>
+                      <a:round/>
+                      <a:headEnd type="none" w="med" len="med"/>
+                      <a:tailEnd type="none" w="med" len="med"/>
+                    </a:lnR>
+                    <a:lnT w="12700" cmpd="sng">
+                      <a:noFill/>
+                    </a:lnT>
+                    <a:lnB w="12700" cmpd="sng">
+                      <a:noFill/>
+                    </a:lnB>
+                    <a:lnTlToBr w="12700" cmpd="sng">
+                      <a:noFill/>
+                      <a:prstDash val="solid"/>
+                    </a:lnTlToBr>
+                    <a:lnBlToTr w="12700" cmpd="sng">
+                      <a:noFill/>
+                      <a:prstDash val="solid"/>
+                    </a:lnBlToTr>
+                  </a:tcPr>
+                </a:tc>
+                <a:tc vMerge="1">
+                  <a:txBody>
+                    <a:bodyPr/>
+                    <a:lstStyle/>
+                    <a:p>
+                      <a:pPr algn="ctr"/>
+                      <a:r>
+                        <a:rPr lang="en-US" sz="1050" dirty="0"/>
+                        <a:t>144 responded</a:t>
+                      </a:r>
+                    </a:p>
+                  </a:txBody>
+                  <a:tcPr marL="79295" marR="79295" marT="39648" marB="39648" anchor="ctr">
+                    <a:lnL w="12700" cap="flat" cmpd="sng" algn="ctr">
+                      <a:solidFill>
+                        <a:schemeClr val="tx1"/>
+                      </a:solidFill>
+                      <a:prstDash val="solid"/>
+                      <a:round/>
+                      <a:headEnd type="none" w="med" len="med"/>
+                      <a:tailEnd type="none" w="med" len="med"/>
+                    </a:lnL>
+                    <a:lnR w="12700" cap="flat" cmpd="sng" algn="ctr">
+                      <a:solidFill>
+                        <a:schemeClr val="tx1"/>
+                      </a:solidFill>
+                      <a:prstDash val="solid"/>
+                      <a:round/>
+                      <a:headEnd type="none" w="med" len="med"/>
+                      <a:tailEnd type="none" w="med" len="med"/>
+                    </a:lnR>
+                    <a:lnT w="12700" cap="flat" cmpd="sng" algn="ctr">
+                      <a:solidFill>
+                        <a:schemeClr val="tx1"/>
+                      </a:solidFill>
+                      <a:prstDash val="solid"/>
+                      <a:round/>
+                      <a:headEnd type="none" w="med" len="med"/>
+                      <a:tailEnd type="none" w="med" len="med"/>
+                    </a:lnT>
+                    <a:lnB w="12700" cap="flat" cmpd="sng" algn="ctr">
+                      <a:noFill/>
+                      <a:prstDash val="solid"/>
+                      <a:round/>
+                      <a:headEnd type="none" w="med" len="med"/>
+                      <a:tailEnd type="none" w="med" len="med"/>
+                    </a:lnB>
+                    <a:lnTlToBr w="12700" cmpd="sng">
+                      <a:noFill/>
+                      <a:prstDash val="solid"/>
+                    </a:lnTlToBr>
+                    <a:lnBlToTr w="12700" cmpd="sng">
+                      <a:noFill/>
+                      <a:prstDash val="solid"/>
+                    </a:lnBlToTr>
+                  </a:tcPr>
+                </a:tc>
+                <a:tc>
+                  <a:txBody>
+                    <a:bodyPr/>
+                    <a:lstStyle/>
+                    <a:p>
+                      <a:pPr algn="ctr"/>
+                      <a:endParaRPr lang="en-US" sz="1800" dirty="0"/>
+                    </a:p>
+                  </a:txBody>
+                  <a:tcPr marL="79295" marR="79295" marT="39648" marB="39648" anchor="ctr">
+                    <a:lnL w="12700" cap="flat" cmpd="sng" algn="ctr">
+                      <a:solidFill>
+                        <a:schemeClr val="tx1"/>
+                      </a:solidFill>
+                      <a:prstDash val="solid"/>
+                      <a:round/>
+                      <a:headEnd type="none" w="med" len="med"/>
+                      <a:tailEnd type="none" w="med" len="med"/>
+                    </a:lnL>
+                    <a:lnR w="12700" cap="flat" cmpd="sng" algn="ctr">
+                      <a:solidFill>
+                        <a:schemeClr val="tx1"/>
+                      </a:solidFill>
+                      <a:prstDash val="solid"/>
+                      <a:round/>
+                      <a:headEnd type="none" w="med" len="med"/>
+                      <a:tailEnd type="none" w="med" len="med"/>
+                    </a:lnR>
+                    <a:lnT w="12700" cmpd="sng">
+                      <a:noFill/>
+                    </a:lnT>
+                    <a:lnB w="12700" cmpd="sng">
+                      <a:noFill/>
+                    </a:lnB>
+                    <a:lnTlToBr w="12700" cmpd="sng">
+                      <a:noFill/>
+                      <a:prstDash val="solid"/>
+                    </a:lnTlToBr>
+                    <a:lnBlToTr w="12700" cmpd="sng">
+                      <a:noFill/>
+                      <a:prstDash val="solid"/>
+                    </a:lnBlToTr>
+                  </a:tcPr>
+                </a:tc>
+                <a:tc vMerge="1">
+                  <a:txBody>
+                    <a:bodyPr/>
+                    <a:lstStyle/>
+                    <a:p>
+                      <a:pPr algn="ctr"/>
+                      <a:endParaRPr lang="en-US" sz="800"/>
+                    </a:p>
+                  </a:txBody>
+                  <a:tcPr marL="79295" marR="79295" marT="39648" marB="39648" anchor="ctr">
+                    <a:lnL w="12700" cap="flat" cmpd="sng" algn="ctr">
+                      <a:solidFill>
+                        <a:schemeClr val="tx1"/>
+                      </a:solidFill>
+                      <a:prstDash val="solid"/>
+                      <a:round/>
+                      <a:headEnd type="none" w="med" len="med"/>
+                      <a:tailEnd type="none" w="med" len="med"/>
+                    </a:lnL>
+                    <a:lnT w="12700" cap="flat" cmpd="sng" algn="ctr">
+                      <a:solidFill>
+                        <a:schemeClr val="tx1"/>
+                      </a:solidFill>
+                      <a:prstDash val="solid"/>
+                      <a:round/>
+                      <a:headEnd type="none" w="med" len="med"/>
+                      <a:tailEnd type="none" w="med" len="med"/>
+                    </a:lnT>
+                  </a:tcPr>
+                </a:tc>
+                <a:tc>
+                  <a:txBody>
+                    <a:bodyPr/>
+                    <a:lstStyle/>
+                    <a:p>
+                      <a:pPr algn="ctr"/>
+                      <a:endParaRPr lang="en-US" sz="1050" dirty="0"/>
+                    </a:p>
+                  </a:txBody>
+                  <a:tcPr marL="79295" marR="79295" marT="39648" marB="39648" anchor="ctr">
                     <a:lnR w="12700" cmpd="sng">
                       <a:noFill/>
                     </a:lnR>
@@ -6841,7 +7358,688 @@
                     </a:lnBlToTr>
                   </a:tcPr>
                 </a:tc>
+                <a:extLst>
+                  <a:ext uri="{0D108BD9-81ED-4DB2-BD59-A6C34878D82A}">
+                    <a16:rowId xmlns:a16="http://schemas.microsoft.com/office/drawing/2014/main" val="2201695431"/>
+                  </a:ext>
+                </a:extLst>
+              </a:tr>
+              <a:tr h="353616">
+                <a:tc vMerge="1">
+                  <a:txBody>
+                    <a:bodyPr/>
+                    <a:lstStyle/>
+                    <a:p>
+                      <a:pPr algn="ctr"/>
+                      <a:endParaRPr lang="en-US" sz="800" dirty="0"/>
+                    </a:p>
+                  </a:txBody>
+                  <a:tcPr marL="79295" marR="79295" marT="39648" marB="39648" vert="vert270" anchor="ctr">
+                    <a:lnT w="12700" cmpd="sng">
+                      <a:noFill/>
+                    </a:lnT>
+                  </a:tcPr>
+                </a:tc>
                 <a:tc>
+                  <a:txBody>
+                    <a:bodyPr/>
+                    <a:lstStyle/>
+                    <a:p>
+                      <a:pPr algn="ctr"/>
+                      <a:endParaRPr lang="en-US" sz="1050"/>
+                    </a:p>
+                  </a:txBody>
+                  <a:tcPr marL="79295" marR="79295" marT="39648" marB="39648" anchor="ctr">
+                    <a:lnR w="12700" cmpd="sng">
+                      <a:noFill/>
+                    </a:lnR>
+                    <a:lnT w="12700" cmpd="sng">
+                      <a:noFill/>
+                    </a:lnT>
+                    <a:lnB w="12700" cmpd="sng">
+                      <a:noFill/>
+                    </a:lnB>
+                    <a:lnTlToBr w="12700" cmpd="sng">
+                      <a:noFill/>
+                      <a:prstDash val="solid"/>
+                    </a:lnTlToBr>
+                    <a:lnBlToTr w="12700" cmpd="sng">
+                      <a:noFill/>
+                      <a:prstDash val="solid"/>
+                    </a:lnBlToTr>
+                  </a:tcPr>
+                </a:tc>
+                <a:tc>
+                  <a:txBody>
+                    <a:bodyPr/>
+                    <a:lstStyle/>
+                    <a:p>
+                      <a:pPr algn="ctr"/>
+                      <a:endParaRPr lang="en-US" sz="1050" dirty="0"/>
+                    </a:p>
+                  </a:txBody>
+                  <a:tcPr marL="79295" marR="79295" marT="39648" marB="39648" anchor="ctr">
+                    <a:lnL w="12700" cmpd="sng">
+                      <a:noFill/>
+                    </a:lnL>
+                    <a:lnR w="12700" cmpd="sng">
+                      <a:noFill/>
+                    </a:lnR>
+                    <a:lnT w="12700" cmpd="sng">
+                      <a:noFill/>
+                    </a:lnT>
+                    <a:lnB w="12700" cmpd="sng">
+                      <a:noFill/>
+                    </a:lnB>
+                    <a:lnTlToBr w="12700" cmpd="sng">
+                      <a:noFill/>
+                      <a:prstDash val="solid"/>
+                    </a:lnTlToBr>
+                    <a:lnBlToTr w="12700" cmpd="sng">
+                      <a:noFill/>
+                      <a:prstDash val="solid"/>
+                    </a:lnBlToTr>
+                  </a:tcPr>
+                </a:tc>
+                <a:tc>
+                  <a:txBody>
+                    <a:bodyPr/>
+                    <a:lstStyle/>
+                    <a:p>
+                      <a:pPr algn="ctr"/>
+                      <a:endParaRPr lang="en-US" sz="1800"/>
+                    </a:p>
+                  </a:txBody>
+                  <a:tcPr marL="79295" marR="79295" marT="39648" marB="39648" anchor="ctr">
+                    <a:lnL w="12700" cmpd="sng">
+                      <a:noFill/>
+                    </a:lnL>
+                    <a:lnR w="12700" cap="flat" cmpd="sng" algn="ctr">
+                      <a:noFill/>
+                      <a:prstDash val="solid"/>
+                      <a:round/>
+                      <a:headEnd type="none" w="med" len="med"/>
+                      <a:tailEnd type="none" w="med" len="med"/>
+                    </a:lnR>
+                    <a:lnT w="12700" cmpd="sng">
+                      <a:noFill/>
+                    </a:lnT>
+                    <a:lnB w="12700" cmpd="sng">
+                      <a:noFill/>
+                    </a:lnB>
+                    <a:lnTlToBr w="12700" cmpd="sng">
+                      <a:noFill/>
+                      <a:prstDash val="solid"/>
+                    </a:lnTlToBr>
+                    <a:lnBlToTr w="12700" cmpd="sng">
+                      <a:noFill/>
+                      <a:prstDash val="solid"/>
+                    </a:lnBlToTr>
+                  </a:tcPr>
+                </a:tc>
+                <a:tc>
+                  <a:txBody>
+                    <a:bodyPr/>
+                    <a:lstStyle/>
+                    <a:p>
+                      <a:pPr marL="0" marR="0" lvl="0" indent="0" algn="ctr" defTabSz="612008" rtl="0" eaLnBrk="1" fontAlgn="auto" latinLnBrk="0" hangingPunct="1">
+                        <a:lnSpc>
+                          <a:spcPct val="100000"/>
+                        </a:lnSpc>
+                        <a:spcBef>
+                          <a:spcPts val="0"/>
+                        </a:spcBef>
+                        <a:spcAft>
+                          <a:spcPts val="0"/>
+                        </a:spcAft>
+                        <a:buClrTx/>
+                        <a:buSzTx/>
+                        <a:buFontTx/>
+                        <a:buNone/>
+                        <a:tabLst/>
+                        <a:defRPr/>
+                      </a:pPr>
+                      <a:r>
+                        <a:rPr lang="en-US" sz="1800" kern="1200" dirty="0">
+                          <a:solidFill>
+                            <a:schemeClr val="tx1"/>
+                          </a:solidFill>
+                          <a:effectLst/>
+                          <a:latin typeface="+mn-lt"/>
+                          <a:ea typeface="+mn-ea"/>
+                          <a:cs typeface="+mn-cs"/>
+                        </a:rPr>
+                        <a:t>↓</a:t>
+                      </a:r>
+                    </a:p>
+                  </a:txBody>
+                  <a:tcPr marL="79295" marR="79295" marT="39648" marB="39648" anchor="ctr">
+                    <a:lnL w="12700" cap="flat" cmpd="sng" algn="ctr">
+                      <a:noFill/>
+                      <a:prstDash val="solid"/>
+                      <a:round/>
+                      <a:headEnd type="none" w="med" len="med"/>
+                      <a:tailEnd type="none" w="med" len="med"/>
+                    </a:lnL>
+                    <a:lnR w="12700" cap="flat" cmpd="sng" algn="ctr">
+                      <a:noFill/>
+                      <a:prstDash val="solid"/>
+                      <a:round/>
+                      <a:headEnd type="none" w="med" len="med"/>
+                      <a:tailEnd type="none" w="med" len="med"/>
+                    </a:lnR>
+                    <a:lnT w="12700" cap="flat" cmpd="sng" algn="ctr">
+                      <a:solidFill>
+                        <a:schemeClr val="tx1"/>
+                      </a:solidFill>
+                      <a:prstDash val="solid"/>
+                      <a:round/>
+                      <a:headEnd type="none" w="med" len="med"/>
+                      <a:tailEnd type="none" w="med" len="med"/>
+                    </a:lnT>
+                    <a:lnB w="12700" cap="flat" cmpd="sng" algn="ctr">
+                      <a:solidFill>
+                        <a:schemeClr val="tx1"/>
+                      </a:solidFill>
+                      <a:prstDash val="solid"/>
+                      <a:round/>
+                      <a:headEnd type="none" w="med" len="med"/>
+                      <a:tailEnd type="none" w="med" len="med"/>
+                    </a:lnB>
+                    <a:lnTlToBr w="12700" cmpd="sng">
+                      <a:noFill/>
+                      <a:prstDash val="solid"/>
+                    </a:lnTlToBr>
+                    <a:lnBlToTr w="12700" cmpd="sng">
+                      <a:noFill/>
+                      <a:prstDash val="solid"/>
+                    </a:lnBlToTr>
+                  </a:tcPr>
+                </a:tc>
+                <a:tc>
+                  <a:txBody>
+                    <a:bodyPr/>
+                    <a:lstStyle/>
+                    <a:p>
+                      <a:pPr algn="ctr"/>
+                      <a:endParaRPr lang="en-US" sz="1800" dirty="0"/>
+                    </a:p>
+                  </a:txBody>
+                  <a:tcPr marL="79295" marR="79295" marT="39648" marB="39648" anchor="ctr">
+                    <a:lnL w="12700" cap="flat" cmpd="sng" algn="ctr">
+                      <a:noFill/>
+                      <a:prstDash val="solid"/>
+                      <a:round/>
+                      <a:headEnd type="none" w="med" len="med"/>
+                      <a:tailEnd type="none" w="med" len="med"/>
+                    </a:lnL>
+                    <a:lnR w="12700" cap="flat" cmpd="sng" algn="ctr">
+                      <a:solidFill>
+                        <a:schemeClr val="tx1"/>
+                      </a:solidFill>
+                      <a:prstDash val="solid"/>
+                      <a:round/>
+                      <a:headEnd type="none" w="med" len="med"/>
+                      <a:tailEnd type="none" w="med" len="med"/>
+                    </a:lnR>
+                    <a:lnT w="12700" cmpd="sng">
+                      <a:noFill/>
+                    </a:lnT>
+                    <a:lnB w="12700" cmpd="sng">
+                      <a:noFill/>
+                    </a:lnB>
+                    <a:lnTlToBr w="12700" cmpd="sng">
+                      <a:noFill/>
+                      <a:prstDash val="solid"/>
+                    </a:lnTlToBr>
+                    <a:lnBlToTr w="12700" cmpd="sng">
+                      <a:noFill/>
+                      <a:prstDash val="solid"/>
+                    </a:lnBlToTr>
+                  </a:tcPr>
+                </a:tc>
+                <a:tc vMerge="1">
+                  <a:txBody>
+                    <a:bodyPr/>
+                    <a:lstStyle/>
+                    <a:p>
+                      <a:pPr algn="ctr"/>
+                      <a:endParaRPr lang="en-US" sz="800" dirty="0"/>
+                    </a:p>
+                  </a:txBody>
+                  <a:tcPr marL="79295" marR="79295" marT="39648" marB="39648" anchor="ctr">
+                    <a:lnL w="12700" cap="flat" cmpd="sng" algn="ctr">
+                      <a:solidFill>
+                        <a:schemeClr val="tx1"/>
+                      </a:solidFill>
+                      <a:prstDash val="solid"/>
+                      <a:round/>
+                      <a:headEnd type="none" w="med" len="med"/>
+                      <a:tailEnd type="none" w="med" len="med"/>
+                    </a:lnL>
+                    <a:lnT w="12700" cap="flat" cmpd="sng" algn="ctr">
+                      <a:solidFill>
+                        <a:schemeClr val="tx1"/>
+                      </a:solidFill>
+                      <a:prstDash val="solid"/>
+                      <a:round/>
+                      <a:headEnd type="none" w="med" len="med"/>
+                      <a:tailEnd type="none" w="med" len="med"/>
+                    </a:lnT>
+                  </a:tcPr>
+                </a:tc>
+                <a:tc>
+                  <a:txBody>
+                    <a:bodyPr/>
+                    <a:lstStyle/>
+                    <a:p>
+                      <a:pPr algn="ctr"/>
+                      <a:endParaRPr lang="en-US" sz="1050" dirty="0"/>
+                    </a:p>
+                  </a:txBody>
+                  <a:tcPr marL="79295" marR="79295" marT="39648" marB="39648" anchor="ctr">
+                    <a:lnR w="12700" cmpd="sng">
+                      <a:noFill/>
+                    </a:lnR>
+                    <a:lnT w="12700" cmpd="sng">
+                      <a:noFill/>
+                    </a:lnT>
+                    <a:lnB w="12700" cmpd="sng">
+                      <a:noFill/>
+                    </a:lnB>
+                    <a:lnTlToBr w="12700" cmpd="sng">
+                      <a:noFill/>
+                      <a:prstDash val="solid"/>
+                    </a:lnTlToBr>
+                    <a:lnBlToTr w="12700" cmpd="sng">
+                      <a:noFill/>
+                      <a:prstDash val="solid"/>
+                    </a:lnBlToTr>
+                  </a:tcPr>
+                </a:tc>
+                <a:extLst>
+                  <a:ext uri="{0D108BD9-81ED-4DB2-BD59-A6C34878D82A}">
+                    <a16:rowId xmlns:a16="http://schemas.microsoft.com/office/drawing/2014/main" val="3826755273"/>
+                  </a:ext>
+                </a:extLst>
+              </a:tr>
+              <a:tr h="369563">
+                <a:tc vMerge="1">
+                  <a:txBody>
+                    <a:bodyPr/>
+                    <a:lstStyle/>
+                    <a:p>
+                      <a:pPr algn="ctr"/>
+                      <a:endParaRPr lang="en-US" sz="800" dirty="0"/>
+                    </a:p>
+                  </a:txBody>
+                  <a:tcPr marL="79295" marR="79295" marT="39648" marB="39648" vert="vert270" anchor="ctr">
+                    <a:lnT w="12700" cmpd="sng">
+                      <a:noFill/>
+                    </a:lnT>
+                  </a:tcPr>
+                </a:tc>
+                <a:tc>
+                  <a:txBody>
+                    <a:bodyPr/>
+                    <a:lstStyle/>
+                    <a:p>
+                      <a:pPr algn="ctr"/>
+                      <a:endParaRPr lang="en-US" sz="1050"/>
+                    </a:p>
+                  </a:txBody>
+                  <a:tcPr marL="79295" marR="79295" marT="39648" marB="39648" anchor="ctr">
+                    <a:lnR w="12700" cmpd="sng">
+                      <a:noFill/>
+                    </a:lnR>
+                    <a:lnT w="12700" cmpd="sng">
+                      <a:noFill/>
+                    </a:lnT>
+                    <a:lnB w="12700" cmpd="sng">
+                      <a:noFill/>
+                    </a:lnB>
+                    <a:lnTlToBr w="12700" cmpd="sng">
+                      <a:noFill/>
+                      <a:prstDash val="solid"/>
+                    </a:lnTlToBr>
+                    <a:lnBlToTr w="12700" cmpd="sng">
+                      <a:noFill/>
+                      <a:prstDash val="solid"/>
+                    </a:lnBlToTr>
+                  </a:tcPr>
+                </a:tc>
+                <a:tc>
+                  <a:txBody>
+                    <a:bodyPr/>
+                    <a:lstStyle/>
+                    <a:p>
+                      <a:pPr algn="ctr"/>
+                      <a:endParaRPr lang="en-US" sz="1050" dirty="0"/>
+                    </a:p>
+                  </a:txBody>
+                  <a:tcPr marL="79295" marR="79295" marT="39648" marB="39648" anchor="ctr">
+                    <a:lnL w="12700" cmpd="sng">
+                      <a:noFill/>
+                    </a:lnL>
+                    <a:lnR w="12700" cmpd="sng">
+                      <a:noFill/>
+                    </a:lnR>
+                    <a:lnT w="12700" cmpd="sng">
+                      <a:noFill/>
+                    </a:lnT>
+                    <a:lnB w="12700" cmpd="sng">
+                      <a:noFill/>
+                    </a:lnB>
+                    <a:lnTlToBr w="12700" cmpd="sng">
+                      <a:noFill/>
+                      <a:prstDash val="solid"/>
+                    </a:lnTlToBr>
+                    <a:lnBlToTr w="12700" cmpd="sng">
+                      <a:noFill/>
+                      <a:prstDash val="solid"/>
+                    </a:lnBlToTr>
+                  </a:tcPr>
+                </a:tc>
+                <a:tc>
+                  <a:txBody>
+                    <a:bodyPr/>
+                    <a:lstStyle/>
+                    <a:p>
+                      <a:pPr algn="ctr"/>
+                      <a:endParaRPr lang="en-US" sz="1800"/>
+                    </a:p>
+                  </a:txBody>
+                  <a:tcPr marL="79295" marR="79295" marT="39648" marB="39648" anchor="ctr">
+                    <a:lnL w="12700" cmpd="sng">
+                      <a:noFill/>
+                    </a:lnL>
+                    <a:lnR w="12700" cap="flat" cmpd="sng" algn="ctr">
+                      <a:solidFill>
+                        <a:schemeClr val="tx1"/>
+                      </a:solidFill>
+                      <a:prstDash val="solid"/>
+                      <a:round/>
+                      <a:headEnd type="none" w="med" len="med"/>
+                      <a:tailEnd type="none" w="med" len="med"/>
+                    </a:lnR>
+                    <a:lnT w="12700" cmpd="sng">
+                      <a:noFill/>
+                    </a:lnT>
+                    <a:lnB w="12700" cmpd="sng">
+                      <a:noFill/>
+                    </a:lnB>
+                    <a:lnTlToBr w="12700" cmpd="sng">
+                      <a:noFill/>
+                      <a:prstDash val="solid"/>
+                    </a:lnTlToBr>
+                    <a:lnBlToTr w="12700" cmpd="sng">
+                      <a:noFill/>
+                      <a:prstDash val="solid"/>
+                    </a:lnBlToTr>
+                  </a:tcPr>
+                </a:tc>
+                <a:tc>
+                  <a:txBody>
+                    <a:bodyPr/>
+                    <a:lstStyle/>
+                    <a:p>
+                      <a:pPr algn="ctr"/>
+                      <a:r>
+                        <a:rPr lang="en-US" sz="1050" dirty="0"/>
+                        <a:t>Data request successful for 163 publications</a:t>
+                      </a:r>
+                    </a:p>
+                  </a:txBody>
+                  <a:tcPr marL="79295" marR="79295" marT="39648" marB="39648" anchor="ctr">
+                    <a:lnL w="12700" cap="flat" cmpd="sng" algn="ctr">
+                      <a:solidFill>
+                        <a:schemeClr val="tx1"/>
+                      </a:solidFill>
+                      <a:prstDash val="solid"/>
+                      <a:round/>
+                      <a:headEnd type="none" w="med" len="med"/>
+                      <a:tailEnd type="none" w="med" len="med"/>
+                    </a:lnL>
+                    <a:lnR w="12700" cap="flat" cmpd="sng" algn="ctr">
+                      <a:solidFill>
+                        <a:schemeClr val="tx1"/>
+                      </a:solidFill>
+                      <a:prstDash val="solid"/>
+                      <a:round/>
+                      <a:headEnd type="none" w="med" len="med"/>
+                      <a:tailEnd type="none" w="med" len="med"/>
+                    </a:lnR>
+                    <a:lnT w="12700" cap="flat" cmpd="sng" algn="ctr">
+                      <a:solidFill>
+                        <a:schemeClr val="tx1"/>
+                      </a:solidFill>
+                      <a:prstDash val="solid"/>
+                      <a:round/>
+                      <a:headEnd type="none" w="med" len="med"/>
+                      <a:tailEnd type="none" w="med" len="med"/>
+                    </a:lnT>
+                    <a:lnB w="12700" cap="flat" cmpd="sng" algn="ctr">
+                      <a:solidFill>
+                        <a:schemeClr val="tx1"/>
+                      </a:solidFill>
+                      <a:prstDash val="solid"/>
+                      <a:round/>
+                      <a:headEnd type="none" w="med" len="med"/>
+                      <a:tailEnd type="none" w="med" len="med"/>
+                    </a:lnB>
+                    <a:lnTlToBr w="12700" cmpd="sng">
+                      <a:noFill/>
+                      <a:prstDash val="solid"/>
+                    </a:lnTlToBr>
+                    <a:lnBlToTr w="12700" cmpd="sng">
+                      <a:noFill/>
+                      <a:prstDash val="solid"/>
+                    </a:lnBlToTr>
+                  </a:tcPr>
+                </a:tc>
+                <a:tc>
+                  <a:txBody>
+                    <a:bodyPr/>
+                    <a:lstStyle/>
+                    <a:p>
+                      <a:pPr algn="ctr"/>
+                      <a:endParaRPr lang="en-US" sz="1800" dirty="0"/>
+                    </a:p>
+                  </a:txBody>
+                  <a:tcPr marL="79295" marR="79295" marT="39648" marB="39648" anchor="ctr">
+                    <a:lnL w="12700" cap="flat" cmpd="sng" algn="ctr">
+                      <a:solidFill>
+                        <a:schemeClr val="tx1"/>
+                      </a:solidFill>
+                      <a:prstDash val="solid"/>
+                      <a:round/>
+                      <a:headEnd type="none" w="med" len="med"/>
+                      <a:tailEnd type="none" w="med" len="med"/>
+                    </a:lnL>
+                    <a:lnR w="12700" cap="flat" cmpd="sng" algn="ctr">
+                      <a:solidFill>
+                        <a:schemeClr val="tx1"/>
+                      </a:solidFill>
+                      <a:prstDash val="solid"/>
+                      <a:round/>
+                      <a:headEnd type="none" w="med" len="med"/>
+                      <a:tailEnd type="none" w="med" len="med"/>
+                    </a:lnR>
+                    <a:lnT w="12700" cmpd="sng">
+                      <a:noFill/>
+                    </a:lnT>
+                    <a:lnB w="12700" cmpd="sng">
+                      <a:noFill/>
+                    </a:lnB>
+                    <a:lnTlToBr w="12700" cmpd="sng">
+                      <a:noFill/>
+                      <a:prstDash val="solid"/>
+                    </a:lnTlToBr>
+                    <a:lnBlToTr w="12700" cmpd="sng">
+                      <a:noFill/>
+                      <a:prstDash val="solid"/>
+                    </a:lnBlToTr>
+                  </a:tcPr>
+                </a:tc>
+                <a:tc vMerge="1">
+                  <a:txBody>
+                    <a:bodyPr/>
+                    <a:lstStyle/>
+                    <a:p>
+                      <a:pPr algn="ctr"/>
+                      <a:endParaRPr lang="en-US" sz="800" dirty="0"/>
+                    </a:p>
+                  </a:txBody>
+                  <a:tcPr marL="79295" marR="79295" marT="39648" marB="39648" anchor="ctr">
+                    <a:lnL w="12700" cap="flat" cmpd="sng" algn="ctr">
+                      <a:solidFill>
+                        <a:schemeClr val="tx1"/>
+                      </a:solidFill>
+                      <a:prstDash val="solid"/>
+                      <a:round/>
+                      <a:headEnd type="none" w="med" len="med"/>
+                      <a:tailEnd type="none" w="med" len="med"/>
+                    </a:lnL>
+                    <a:lnT w="12700" cap="flat" cmpd="sng" algn="ctr">
+                      <a:solidFill>
+                        <a:schemeClr val="tx1"/>
+                      </a:solidFill>
+                      <a:prstDash val="solid"/>
+                      <a:round/>
+                      <a:headEnd type="none" w="med" len="med"/>
+                      <a:tailEnd type="none" w="med" len="med"/>
+                    </a:lnT>
+                  </a:tcPr>
+                </a:tc>
+                <a:tc>
+                  <a:txBody>
+                    <a:bodyPr/>
+                    <a:lstStyle/>
+                    <a:p>
+                      <a:pPr algn="ctr"/>
+                      <a:endParaRPr lang="en-US" sz="1050" dirty="0"/>
+                    </a:p>
+                  </a:txBody>
+                  <a:tcPr marL="79295" marR="79295" marT="39648" marB="39648" anchor="ctr">
+                    <a:lnR w="12700" cmpd="sng">
+                      <a:noFill/>
+                    </a:lnR>
+                    <a:lnT w="12700" cmpd="sng">
+                      <a:noFill/>
+                    </a:lnT>
+                    <a:lnB w="12700" cmpd="sng">
+                      <a:noFill/>
+                    </a:lnB>
+                    <a:lnTlToBr w="12700" cmpd="sng">
+                      <a:noFill/>
+                      <a:prstDash val="solid"/>
+                    </a:lnTlToBr>
+                    <a:lnBlToTr w="12700" cmpd="sng">
+                      <a:noFill/>
+                      <a:prstDash val="solid"/>
+                    </a:lnBlToTr>
+                  </a:tcPr>
+                </a:tc>
+                <a:extLst>
+                  <a:ext uri="{0D108BD9-81ED-4DB2-BD59-A6C34878D82A}">
+                    <a16:rowId xmlns:a16="http://schemas.microsoft.com/office/drawing/2014/main" val="637476808"/>
+                  </a:ext>
+                </a:extLst>
+              </a:tr>
+              <a:tr h="145229">
+                <a:tc vMerge="1">
+                  <a:txBody>
+                    <a:bodyPr/>
+                    <a:lstStyle/>
+                    <a:p>
+                      <a:pPr algn="ctr"/>
+                      <a:endParaRPr lang="en-US" sz="1400" dirty="0"/>
+                    </a:p>
+                  </a:txBody>
+                  <a:tcPr marL="79295" marR="79295" marT="39648" marB="39648" vert="vert270" anchor="ctr">
+                    <a:lnL w="12700" cap="flat" cmpd="sng" algn="ctr">
+                      <a:solidFill>
+                        <a:schemeClr val="tx1"/>
+                      </a:solidFill>
+                      <a:prstDash val="solid"/>
+                      <a:round/>
+                      <a:headEnd type="none" w="med" len="med"/>
+                      <a:tailEnd type="none" w="med" len="med"/>
+                    </a:lnL>
+                    <a:lnR w="12700" cap="flat" cmpd="sng" algn="ctr">
+                      <a:solidFill>
+                        <a:schemeClr val="tx1"/>
+                      </a:solidFill>
+                      <a:prstDash val="solid"/>
+                      <a:round/>
+                      <a:headEnd type="none" w="med" len="med"/>
+                      <a:tailEnd type="none" w="med" len="med"/>
+                    </a:lnR>
+                    <a:lnT w="12700" cap="flat" cmpd="sng" algn="ctr">
+                      <a:noFill/>
+                      <a:prstDash val="solid"/>
+                      <a:round/>
+                      <a:headEnd type="none" w="med" len="med"/>
+                      <a:tailEnd type="none" w="med" len="med"/>
+                    </a:lnT>
+                    <a:lnB w="12700" cap="flat" cmpd="sng" algn="ctr">
+                      <a:solidFill>
+                        <a:schemeClr val="tx1"/>
+                      </a:solidFill>
+                      <a:prstDash val="solid"/>
+                      <a:round/>
+                      <a:headEnd type="none" w="med" len="med"/>
+                      <a:tailEnd type="none" w="med" len="med"/>
+                    </a:lnB>
+                    <a:lnTlToBr w="12700" cmpd="sng">
+                      <a:noFill/>
+                      <a:prstDash val="solid"/>
+                    </a:lnTlToBr>
+                    <a:lnBlToTr w="12700" cmpd="sng">
+                      <a:noFill/>
+                      <a:prstDash val="solid"/>
+                    </a:lnBlToTr>
+                  </a:tcPr>
+                </a:tc>
+                <a:tc rowSpan="2">
+                  <a:txBody>
+                    <a:bodyPr/>
+                    <a:lstStyle/>
+                    <a:p>
+                      <a:pPr algn="ctr"/>
+                      <a:endParaRPr lang="en-US" sz="1800" dirty="0"/>
+                    </a:p>
+                  </a:txBody>
+                  <a:tcPr marL="79295" marR="79295" marT="39648" marB="39648" anchor="ctr">
+                    <a:lnL w="12700" cap="flat" cmpd="sng" algn="ctr">
+                      <a:solidFill>
+                        <a:schemeClr val="tx1"/>
+                      </a:solidFill>
+                      <a:prstDash val="solid"/>
+                      <a:round/>
+                      <a:headEnd type="none" w="med" len="med"/>
+                      <a:tailEnd type="none" w="med" len="med"/>
+                    </a:lnL>
+                    <a:lnR w="12700" cmpd="sng">
+                      <a:noFill/>
+                    </a:lnR>
+                    <a:lnT w="12700" cmpd="sng">
+                      <a:noFill/>
+                    </a:lnT>
+                    <a:lnB w="12700" cmpd="sng">
+                      <a:noFill/>
+                    </a:lnB>
+                    <a:lnTlToBr w="12700" cmpd="sng">
+                      <a:noFill/>
+                      <a:prstDash val="solid"/>
+                    </a:lnTlToBr>
+                    <a:lnBlToTr w="12700" cmpd="sng">
+                      <a:noFill/>
+                      <a:prstDash val="solid"/>
+                    </a:lnBlToTr>
+                  </a:tcPr>
+                </a:tc>
+                <a:tc rowSpan="2">
                   <a:txBody>
                     <a:bodyPr/>
                     <a:lstStyle/>
@@ -6869,1060 +8067,6 @@
                     <a:lnR w="12700" cmpd="sng">
                       <a:noFill/>
                     </a:lnR>
-                    <a:lnT w="12700" cap="flat" cmpd="sng" algn="ctr">
-                      <a:solidFill>
-                        <a:schemeClr val="tx1"/>
-                      </a:solidFill>
-                      <a:prstDash val="solid"/>
-                      <a:round/>
-                      <a:headEnd type="none" w="med" len="med"/>
-                      <a:tailEnd type="none" w="med" len="med"/>
-                    </a:lnT>
-                    <a:lnB w="12700" cap="flat" cmpd="sng" algn="ctr">
-                      <a:solidFill>
-                        <a:schemeClr val="tx1"/>
-                      </a:solidFill>
-                      <a:prstDash val="solid"/>
-                      <a:round/>
-                      <a:headEnd type="none" w="med" len="med"/>
-                      <a:tailEnd type="none" w="med" len="med"/>
-                    </a:lnB>
-                    <a:lnTlToBr w="12700" cmpd="sng">
-                      <a:noFill/>
-                      <a:prstDash val="solid"/>
-                    </a:lnTlToBr>
-                    <a:lnBlToTr w="12700" cmpd="sng">
-                      <a:noFill/>
-                      <a:prstDash val="solid"/>
-                    </a:lnBlToTr>
-                  </a:tcPr>
-                </a:tc>
-                <a:tc>
-                  <a:txBody>
-                    <a:bodyPr/>
-                    <a:lstStyle/>
-                    <a:p>
-                      <a:pPr algn="ctr"/>
-                      <a:endParaRPr lang="en-US" sz="1800"/>
-                    </a:p>
-                  </a:txBody>
-                  <a:tcPr marL="79295" marR="79295" marT="39648" marB="39648" anchor="ctr">
-                    <a:lnL w="12700" cmpd="sng">
-                      <a:noFill/>
-                    </a:lnL>
-                    <a:lnR w="12700" cap="flat" cmpd="sng" algn="ctr">
-                      <a:solidFill>
-                        <a:schemeClr val="tx1"/>
-                      </a:solidFill>
-                      <a:prstDash val="solid"/>
-                      <a:round/>
-                      <a:headEnd type="none" w="med" len="med"/>
-                      <a:tailEnd type="none" w="med" len="med"/>
-                    </a:lnR>
-                    <a:lnT w="12700" cmpd="sng">
-                      <a:noFill/>
-                    </a:lnT>
-                    <a:lnB w="12700" cmpd="sng">
-                      <a:noFill/>
-                    </a:lnB>
-                    <a:lnTlToBr w="12700" cmpd="sng">
-                      <a:noFill/>
-                      <a:prstDash val="solid"/>
-                    </a:lnTlToBr>
-                    <a:lnBlToTr w="12700" cmpd="sng">
-                      <a:noFill/>
-                      <a:prstDash val="solid"/>
-                    </a:lnBlToTr>
-                  </a:tcPr>
-                </a:tc>
-                <a:tc vMerge="1">
-                  <a:txBody>
-                    <a:bodyPr/>
-                    <a:lstStyle/>
-                    <a:p>
-                      <a:pPr algn="ctr"/>
-                      <a:endParaRPr lang="en-US" sz="800"/>
-                    </a:p>
-                  </a:txBody>
-                  <a:tcPr marL="79295" marR="79295" marT="39648" marB="39648" anchor="ctr"/>
-                </a:tc>
-                <a:tc>
-                  <a:txBody>
-                    <a:bodyPr/>
-                    <a:lstStyle/>
-                    <a:p>
-                      <a:pPr algn="ctr"/>
-                      <a:endParaRPr lang="en-US" sz="1050" dirty="0"/>
-                    </a:p>
-                  </a:txBody>
-                  <a:tcPr marL="79295" marR="79295" marT="39648" marB="39648" anchor="ctr">
-                    <a:lnL w="12700" cap="flat" cmpd="sng" algn="ctr">
-                      <a:solidFill>
-                        <a:schemeClr val="tx1"/>
-                      </a:solidFill>
-                      <a:prstDash val="solid"/>
-                      <a:round/>
-                      <a:headEnd type="none" w="med" len="med"/>
-                      <a:tailEnd type="none" w="med" len="med"/>
-                    </a:lnL>
-                    <a:lnR w="12700" cmpd="sng">
-                      <a:noFill/>
-                    </a:lnR>
-                    <a:lnT w="12700" cmpd="sng">
-                      <a:noFill/>
-                    </a:lnT>
-                    <a:lnB w="12700" cmpd="sng">
-                      <a:noFill/>
-                    </a:lnB>
-                    <a:lnTlToBr w="12700" cmpd="sng">
-                      <a:noFill/>
-                      <a:prstDash val="solid"/>
-                    </a:lnTlToBr>
-                    <a:lnBlToTr w="12700" cmpd="sng">
-                      <a:noFill/>
-                      <a:prstDash val="solid"/>
-                    </a:lnBlToTr>
-                  </a:tcPr>
-                </a:tc>
-                <a:extLst>
-                  <a:ext uri="{0D108BD9-81ED-4DB2-BD59-A6C34878D82A}">
-                    <a16:rowId xmlns:a16="http://schemas.microsoft.com/office/drawing/2014/main" val="1399668982"/>
-                  </a:ext>
-                </a:extLst>
-              </a:tr>
-              <a:tr h="357862">
-                <a:tc vMerge="1">
-                  <a:txBody>
-                    <a:bodyPr/>
-                    <a:lstStyle/>
-                    <a:p>
-                      <a:pPr algn="ctr"/>
-                      <a:endParaRPr lang="en-US" sz="800" dirty="0"/>
-                    </a:p>
-                  </a:txBody>
-                  <a:tcPr marL="79295" marR="79295" marT="39648" marB="39648" vert="vert270" anchor="ctr"/>
-                </a:tc>
-                <a:tc>
-                  <a:txBody>
-                    <a:bodyPr/>
-                    <a:lstStyle/>
-                    <a:p>
-                      <a:pPr algn="ctr"/>
-                      <a:endParaRPr lang="en-US" sz="1050"/>
-                    </a:p>
-                  </a:txBody>
-                  <a:tcPr marL="79295" marR="79295" marT="39648" marB="39648" anchor="ctr">
-                    <a:lnL w="12700" cap="flat" cmpd="sng" algn="ctr">
-                      <a:solidFill>
-                        <a:schemeClr val="tx1"/>
-                      </a:solidFill>
-                      <a:prstDash val="solid"/>
-                      <a:round/>
-                      <a:headEnd type="none" w="med" len="med"/>
-                      <a:tailEnd type="none" w="med" len="med"/>
-                    </a:lnL>
-                    <a:lnR w="12700" cmpd="sng">
-                      <a:noFill/>
-                    </a:lnR>
-                    <a:lnT w="12700" cmpd="sng">
-                      <a:noFill/>
-                    </a:lnT>
-                    <a:lnB w="12700" cmpd="sng">
-                      <a:noFill/>
-                    </a:lnB>
-                    <a:lnTlToBr w="12700" cmpd="sng">
-                      <a:noFill/>
-                      <a:prstDash val="solid"/>
-                    </a:lnTlToBr>
-                    <a:lnBlToTr w="12700" cmpd="sng">
-                      <a:noFill/>
-                      <a:prstDash val="solid"/>
-                    </a:lnBlToTr>
-                  </a:tcPr>
-                </a:tc>
-                <a:tc>
-                  <a:txBody>
-                    <a:bodyPr/>
-                    <a:lstStyle/>
-                    <a:p>
-                      <a:pPr algn="ctr"/>
-                      <a:endParaRPr lang="en-US" sz="1050"/>
-                    </a:p>
-                  </a:txBody>
-                  <a:tcPr marL="79295" marR="79295" marT="39648" marB="39648" anchor="ctr">
-                    <a:lnL w="12700" cmpd="sng">
-                      <a:noFill/>
-                    </a:lnL>
-                    <a:lnR w="12700" cmpd="sng">
-                      <a:noFill/>
-                    </a:lnR>
-                    <a:lnT w="12700" cmpd="sng">
-                      <a:noFill/>
-                    </a:lnT>
-                    <a:lnB w="12700" cmpd="sng">
-                      <a:noFill/>
-                    </a:lnB>
-                    <a:lnTlToBr w="12700" cmpd="sng">
-                      <a:noFill/>
-                      <a:prstDash val="solid"/>
-                    </a:lnTlToBr>
-                    <a:lnBlToTr w="12700" cmpd="sng">
-                      <a:noFill/>
-                      <a:prstDash val="solid"/>
-                    </a:lnBlToTr>
-                  </a:tcPr>
-                </a:tc>
-                <a:tc>
-                  <a:txBody>
-                    <a:bodyPr/>
-                    <a:lstStyle/>
-                    <a:p>
-                      <a:pPr algn="ctr"/>
-                      <a:endParaRPr lang="en-US" sz="1800"/>
-                    </a:p>
-                  </a:txBody>
-                  <a:tcPr marL="79295" marR="79295" marT="39648" marB="39648" anchor="ctr">
-                    <a:lnL w="12700" cmpd="sng">
-                      <a:noFill/>
-                    </a:lnL>
-                    <a:lnR w="12700" cap="flat" cmpd="sng" algn="ctr">
-                      <a:solidFill>
-                        <a:schemeClr val="tx1"/>
-                      </a:solidFill>
-                      <a:prstDash val="solid"/>
-                      <a:round/>
-                      <a:headEnd type="none" w="med" len="med"/>
-                      <a:tailEnd type="none" w="med" len="med"/>
-                    </a:lnR>
-                    <a:lnT w="12700" cmpd="sng">
-                      <a:noFill/>
-                    </a:lnT>
-                    <a:lnB w="12700" cmpd="sng">
-                      <a:noFill/>
-                    </a:lnB>
-                    <a:lnTlToBr w="12700" cmpd="sng">
-                      <a:noFill/>
-                      <a:prstDash val="solid"/>
-                    </a:lnTlToBr>
-                    <a:lnBlToTr w="12700" cmpd="sng">
-                      <a:noFill/>
-                      <a:prstDash val="solid"/>
-                    </a:lnBlToTr>
-                  </a:tcPr>
-                </a:tc>
-                <a:tc>
-                  <a:txBody>
-                    <a:bodyPr/>
-                    <a:lstStyle/>
-                    <a:p>
-                      <a:pPr algn="ctr"/>
-                      <a:r>
-                        <a:rPr lang="en-US" sz="1050" dirty="0"/>
-                        <a:t>144 responded</a:t>
-                      </a:r>
-                    </a:p>
-                  </a:txBody>
-                  <a:tcPr marL="79295" marR="79295" marT="39648" marB="39648" anchor="ctr">
-                    <a:lnL w="12700" cap="flat" cmpd="sng" algn="ctr">
-                      <a:solidFill>
-                        <a:schemeClr val="tx1"/>
-                      </a:solidFill>
-                      <a:prstDash val="solid"/>
-                      <a:round/>
-                      <a:headEnd type="none" w="med" len="med"/>
-                      <a:tailEnd type="none" w="med" len="med"/>
-                    </a:lnL>
-                    <a:lnR w="12700" cap="flat" cmpd="sng" algn="ctr">
-                      <a:solidFill>
-                        <a:schemeClr val="tx1"/>
-                      </a:solidFill>
-                      <a:prstDash val="solid"/>
-                      <a:round/>
-                      <a:headEnd type="none" w="med" len="med"/>
-                      <a:tailEnd type="none" w="med" len="med"/>
-                    </a:lnR>
-                    <a:lnT w="12700" cap="flat" cmpd="sng" algn="ctr">
-                      <a:solidFill>
-                        <a:schemeClr val="tx1"/>
-                      </a:solidFill>
-                      <a:prstDash val="solid"/>
-                      <a:round/>
-                      <a:headEnd type="none" w="med" len="med"/>
-                      <a:tailEnd type="none" w="med" len="med"/>
-                    </a:lnT>
-                    <a:lnB w="12700" cap="flat" cmpd="sng" algn="ctr">
-                      <a:solidFill>
-                        <a:schemeClr val="tx1"/>
-                      </a:solidFill>
-                      <a:prstDash val="solid"/>
-                      <a:round/>
-                      <a:headEnd type="none" w="med" len="med"/>
-                      <a:tailEnd type="none" w="med" len="med"/>
-                    </a:lnB>
-                    <a:lnTlToBr w="12700" cmpd="sng">
-                      <a:noFill/>
-                      <a:prstDash val="solid"/>
-                    </a:lnTlToBr>
-                    <a:lnBlToTr w="12700" cmpd="sng">
-                      <a:noFill/>
-                      <a:prstDash val="solid"/>
-                    </a:lnBlToTr>
-                  </a:tcPr>
-                </a:tc>
-                <a:tc>
-                  <a:txBody>
-                    <a:bodyPr/>
-                    <a:lstStyle/>
-                    <a:p>
-                      <a:pPr algn="ctr"/>
-                      <a:endParaRPr lang="en-US" sz="1800"/>
-                    </a:p>
-                  </a:txBody>
-                  <a:tcPr marL="79295" marR="79295" marT="39648" marB="39648" anchor="ctr">
-                    <a:lnL w="12700" cap="flat" cmpd="sng" algn="ctr">
-                      <a:solidFill>
-                        <a:schemeClr val="tx1"/>
-                      </a:solidFill>
-                      <a:prstDash val="solid"/>
-                      <a:round/>
-                      <a:headEnd type="none" w="med" len="med"/>
-                      <a:tailEnd type="none" w="med" len="med"/>
-                    </a:lnL>
-                    <a:lnR w="12700" cap="flat" cmpd="sng" algn="ctr">
-                      <a:solidFill>
-                        <a:schemeClr val="tx1"/>
-                      </a:solidFill>
-                      <a:prstDash val="solid"/>
-                      <a:round/>
-                      <a:headEnd type="none" w="med" len="med"/>
-                      <a:tailEnd type="none" w="med" len="med"/>
-                    </a:lnR>
-                    <a:lnT w="12700" cmpd="sng">
-                      <a:noFill/>
-                    </a:lnT>
-                    <a:lnB w="12700" cmpd="sng">
-                      <a:noFill/>
-                    </a:lnB>
-                    <a:lnTlToBr w="12700" cmpd="sng">
-                      <a:noFill/>
-                      <a:prstDash val="solid"/>
-                    </a:lnTlToBr>
-                    <a:lnBlToTr w="12700" cmpd="sng">
-                      <a:noFill/>
-                      <a:prstDash val="solid"/>
-                    </a:lnBlToTr>
-                  </a:tcPr>
-                </a:tc>
-                <a:tc vMerge="1">
-                  <a:txBody>
-                    <a:bodyPr/>
-                    <a:lstStyle/>
-                    <a:p>
-                      <a:pPr algn="ctr"/>
-                      <a:endParaRPr lang="en-US" sz="800"/>
-                    </a:p>
-                  </a:txBody>
-                  <a:tcPr marL="79295" marR="79295" marT="39648" marB="39648" anchor="ctr"/>
-                </a:tc>
-                <a:tc>
-                  <a:txBody>
-                    <a:bodyPr/>
-                    <a:lstStyle/>
-                    <a:p>
-                      <a:pPr algn="ctr"/>
-                      <a:endParaRPr lang="en-US" sz="1050" dirty="0"/>
-                    </a:p>
-                  </a:txBody>
-                  <a:tcPr marL="79295" marR="79295" marT="39648" marB="39648" anchor="ctr">
-                    <a:lnL w="12700" cap="flat" cmpd="sng" algn="ctr">
-                      <a:solidFill>
-                        <a:schemeClr val="tx1"/>
-                      </a:solidFill>
-                      <a:prstDash val="solid"/>
-                      <a:round/>
-                      <a:headEnd type="none" w="med" len="med"/>
-                      <a:tailEnd type="none" w="med" len="med"/>
-                    </a:lnL>
-                    <a:lnR w="12700" cmpd="sng">
-                      <a:noFill/>
-                    </a:lnR>
-                    <a:lnT w="12700" cmpd="sng">
-                      <a:noFill/>
-                    </a:lnT>
-                    <a:lnB w="12700" cmpd="sng">
-                      <a:noFill/>
-                    </a:lnB>
-                    <a:lnTlToBr w="12700" cmpd="sng">
-                      <a:noFill/>
-                      <a:prstDash val="solid"/>
-                    </a:lnTlToBr>
-                    <a:lnBlToTr w="12700" cmpd="sng">
-                      <a:noFill/>
-                      <a:prstDash val="solid"/>
-                    </a:lnBlToTr>
-                  </a:tcPr>
-                </a:tc>
-                <a:extLst>
-                  <a:ext uri="{0D108BD9-81ED-4DB2-BD59-A6C34878D82A}">
-                    <a16:rowId xmlns:a16="http://schemas.microsoft.com/office/drawing/2014/main" val="2201695431"/>
-                  </a:ext>
-                </a:extLst>
-              </a:tr>
-              <a:tr h="357862">
-                <a:tc vMerge="1">
-                  <a:txBody>
-                    <a:bodyPr/>
-                    <a:lstStyle/>
-                    <a:p>
-                      <a:pPr algn="ctr"/>
-                      <a:endParaRPr lang="en-US" sz="800" dirty="0"/>
-                    </a:p>
-                  </a:txBody>
-                  <a:tcPr marL="79295" marR="79295" marT="39648" marB="39648" vert="vert270" anchor="ctr"/>
-                </a:tc>
-                <a:tc>
-                  <a:txBody>
-                    <a:bodyPr/>
-                    <a:lstStyle/>
-                    <a:p>
-                      <a:pPr algn="ctr"/>
-                      <a:endParaRPr lang="en-US" sz="1050"/>
-                    </a:p>
-                  </a:txBody>
-                  <a:tcPr marL="79295" marR="79295" marT="39648" marB="39648" anchor="ctr">
-                    <a:lnL w="12700" cap="flat" cmpd="sng" algn="ctr">
-                      <a:solidFill>
-                        <a:schemeClr val="tx1"/>
-                      </a:solidFill>
-                      <a:prstDash val="solid"/>
-                      <a:round/>
-                      <a:headEnd type="none" w="med" len="med"/>
-                      <a:tailEnd type="none" w="med" len="med"/>
-                    </a:lnL>
-                    <a:lnR w="12700" cmpd="sng">
-                      <a:noFill/>
-                    </a:lnR>
-                    <a:lnT w="12700" cmpd="sng">
-                      <a:noFill/>
-                    </a:lnT>
-                    <a:lnB w="12700" cmpd="sng">
-                      <a:noFill/>
-                    </a:lnB>
-                    <a:lnTlToBr w="12700" cmpd="sng">
-                      <a:noFill/>
-                      <a:prstDash val="solid"/>
-                    </a:lnTlToBr>
-                    <a:lnBlToTr w="12700" cmpd="sng">
-                      <a:noFill/>
-                      <a:prstDash val="solid"/>
-                    </a:lnBlToTr>
-                  </a:tcPr>
-                </a:tc>
-                <a:tc>
-                  <a:txBody>
-                    <a:bodyPr/>
-                    <a:lstStyle/>
-                    <a:p>
-                      <a:pPr algn="ctr"/>
-                      <a:endParaRPr lang="en-US" sz="1050"/>
-                    </a:p>
-                  </a:txBody>
-                  <a:tcPr marL="79295" marR="79295" marT="39648" marB="39648" anchor="ctr">
-                    <a:lnL w="12700" cmpd="sng">
-                      <a:noFill/>
-                    </a:lnL>
-                    <a:lnR w="12700" cmpd="sng">
-                      <a:noFill/>
-                    </a:lnR>
-                    <a:lnT w="12700" cmpd="sng">
-                      <a:noFill/>
-                    </a:lnT>
-                    <a:lnB w="12700" cmpd="sng">
-                      <a:noFill/>
-                    </a:lnB>
-                    <a:lnTlToBr w="12700" cmpd="sng">
-                      <a:noFill/>
-                      <a:prstDash val="solid"/>
-                    </a:lnTlToBr>
-                    <a:lnBlToTr w="12700" cmpd="sng">
-                      <a:noFill/>
-                      <a:prstDash val="solid"/>
-                    </a:lnBlToTr>
-                  </a:tcPr>
-                </a:tc>
-                <a:tc>
-                  <a:txBody>
-                    <a:bodyPr/>
-                    <a:lstStyle/>
-                    <a:p>
-                      <a:pPr algn="ctr"/>
-                      <a:endParaRPr lang="en-US" sz="1800"/>
-                    </a:p>
-                  </a:txBody>
-                  <a:tcPr marL="79295" marR="79295" marT="39648" marB="39648" anchor="ctr">
-                    <a:lnL w="12700" cmpd="sng">
-                      <a:noFill/>
-                    </a:lnL>
-                    <a:lnR w="12700" cmpd="sng">
-                      <a:noFill/>
-                    </a:lnR>
-                    <a:lnT w="12700" cmpd="sng">
-                      <a:noFill/>
-                    </a:lnT>
-                    <a:lnB w="12700" cmpd="sng">
-                      <a:noFill/>
-                    </a:lnB>
-                    <a:lnTlToBr w="12700" cmpd="sng">
-                      <a:noFill/>
-                      <a:prstDash val="solid"/>
-                    </a:lnTlToBr>
-                    <a:lnBlToTr w="12700" cmpd="sng">
-                      <a:noFill/>
-                      <a:prstDash val="solid"/>
-                    </a:lnBlToTr>
-                  </a:tcPr>
-                </a:tc>
-                <a:tc>
-                  <a:txBody>
-                    <a:bodyPr/>
-                    <a:lstStyle/>
-                    <a:p>
-                      <a:pPr algn="ctr"/>
-                      <a:r>
-                        <a:rPr lang="en-US" sz="1800" kern="1200" dirty="0">
-                          <a:solidFill>
-                            <a:schemeClr val="tx1"/>
-                          </a:solidFill>
-                          <a:effectLst/>
-                          <a:latin typeface="+mn-lt"/>
-                          <a:ea typeface="+mn-ea"/>
-                          <a:cs typeface="+mn-cs"/>
-                        </a:rPr>
-                        <a:t>↓</a:t>
-                      </a:r>
-                      <a:endParaRPr lang="en-US" sz="1800" dirty="0"/>
-                    </a:p>
-                  </a:txBody>
-                  <a:tcPr marL="79295" marR="79295" marT="39648" marB="39648" anchor="ctr">
-                    <a:lnL w="12700" cmpd="sng">
-                      <a:noFill/>
-                    </a:lnL>
-                    <a:lnR w="12700" cmpd="sng">
-                      <a:noFill/>
-                    </a:lnR>
-                    <a:lnT w="12700" cap="flat" cmpd="sng" algn="ctr">
-                      <a:solidFill>
-                        <a:schemeClr val="tx1"/>
-                      </a:solidFill>
-                      <a:prstDash val="solid"/>
-                      <a:round/>
-                      <a:headEnd type="none" w="med" len="med"/>
-                      <a:tailEnd type="none" w="med" len="med"/>
-                    </a:lnT>
-                    <a:lnB w="12700" cap="flat" cmpd="sng" algn="ctr">
-                      <a:solidFill>
-                        <a:schemeClr val="tx1"/>
-                      </a:solidFill>
-                      <a:prstDash val="solid"/>
-                      <a:round/>
-                      <a:headEnd type="none" w="med" len="med"/>
-                      <a:tailEnd type="none" w="med" len="med"/>
-                    </a:lnB>
-                    <a:lnTlToBr w="12700" cmpd="sng">
-                      <a:noFill/>
-                      <a:prstDash val="solid"/>
-                    </a:lnTlToBr>
-                    <a:lnBlToTr w="12700" cmpd="sng">
-                      <a:noFill/>
-                      <a:prstDash val="solid"/>
-                    </a:lnBlToTr>
-                  </a:tcPr>
-                </a:tc>
-                <a:tc>
-                  <a:txBody>
-                    <a:bodyPr/>
-                    <a:lstStyle/>
-                    <a:p>
-                      <a:pPr algn="ctr"/>
-                      <a:endParaRPr lang="en-US" sz="1800" dirty="0"/>
-                    </a:p>
-                  </a:txBody>
-                  <a:tcPr marL="79295" marR="79295" marT="39648" marB="39648" anchor="ctr">
-                    <a:lnL w="12700" cmpd="sng">
-                      <a:noFill/>
-                    </a:lnL>
-                    <a:lnR w="12700" cap="flat" cmpd="sng" algn="ctr">
-                      <a:solidFill>
-                        <a:schemeClr val="tx1"/>
-                      </a:solidFill>
-                      <a:prstDash val="solid"/>
-                      <a:round/>
-                      <a:headEnd type="none" w="med" len="med"/>
-                      <a:tailEnd type="none" w="med" len="med"/>
-                    </a:lnR>
-                    <a:lnT w="12700" cmpd="sng">
-                      <a:noFill/>
-                    </a:lnT>
-                    <a:lnB w="12700" cmpd="sng">
-                      <a:noFill/>
-                    </a:lnB>
-                    <a:lnTlToBr w="12700" cmpd="sng">
-                      <a:noFill/>
-                      <a:prstDash val="solid"/>
-                    </a:lnTlToBr>
-                    <a:lnBlToTr w="12700" cmpd="sng">
-                      <a:noFill/>
-                      <a:prstDash val="solid"/>
-                    </a:lnBlToTr>
-                  </a:tcPr>
-                </a:tc>
-                <a:tc vMerge="1">
-                  <a:txBody>
-                    <a:bodyPr/>
-                    <a:lstStyle/>
-                    <a:p>
-                      <a:pPr algn="ctr"/>
-                      <a:endParaRPr lang="en-US" sz="800" dirty="0"/>
-                    </a:p>
-                  </a:txBody>
-                  <a:tcPr marL="79295" marR="79295" marT="39648" marB="39648" anchor="ctr"/>
-                </a:tc>
-                <a:tc>
-                  <a:txBody>
-                    <a:bodyPr/>
-                    <a:lstStyle/>
-                    <a:p>
-                      <a:pPr algn="ctr"/>
-                      <a:endParaRPr lang="en-US" sz="1050" dirty="0"/>
-                    </a:p>
-                  </a:txBody>
-                  <a:tcPr marL="79295" marR="79295" marT="39648" marB="39648" anchor="ctr">
-                    <a:lnL w="12700" cap="flat" cmpd="sng" algn="ctr">
-                      <a:solidFill>
-                        <a:schemeClr val="tx1"/>
-                      </a:solidFill>
-                      <a:prstDash val="solid"/>
-                      <a:round/>
-                      <a:headEnd type="none" w="med" len="med"/>
-                      <a:tailEnd type="none" w="med" len="med"/>
-                    </a:lnL>
-                    <a:lnR w="12700" cmpd="sng">
-                      <a:noFill/>
-                    </a:lnR>
-                    <a:lnT w="12700" cmpd="sng">
-                      <a:noFill/>
-                    </a:lnT>
-                    <a:lnB w="12700" cmpd="sng">
-                      <a:noFill/>
-                    </a:lnB>
-                    <a:lnTlToBr w="12700" cmpd="sng">
-                      <a:noFill/>
-                      <a:prstDash val="solid"/>
-                    </a:lnTlToBr>
-                    <a:lnBlToTr w="12700" cmpd="sng">
-                      <a:noFill/>
-                      <a:prstDash val="solid"/>
-                    </a:lnBlToTr>
-                  </a:tcPr>
-                </a:tc>
-                <a:extLst>
-                  <a:ext uri="{0D108BD9-81ED-4DB2-BD59-A6C34878D82A}">
-                    <a16:rowId xmlns:a16="http://schemas.microsoft.com/office/drawing/2014/main" val="3826755273"/>
-                  </a:ext>
-                </a:extLst>
-              </a:tr>
-              <a:tr h="357862">
-                <a:tc vMerge="1">
-                  <a:txBody>
-                    <a:bodyPr/>
-                    <a:lstStyle/>
-                    <a:p>
-                      <a:pPr algn="ctr"/>
-                      <a:endParaRPr lang="en-US" sz="800" dirty="0"/>
-                    </a:p>
-                  </a:txBody>
-                  <a:tcPr marL="79295" marR="79295" marT="39648" marB="39648" vert="vert270" anchor="ctr"/>
-                </a:tc>
-                <a:tc>
-                  <a:txBody>
-                    <a:bodyPr/>
-                    <a:lstStyle/>
-                    <a:p>
-                      <a:pPr algn="ctr"/>
-                      <a:endParaRPr lang="en-US" sz="1050"/>
-                    </a:p>
-                  </a:txBody>
-                  <a:tcPr marL="79295" marR="79295" marT="39648" marB="39648" anchor="ctr">
-                    <a:lnL w="12700" cap="flat" cmpd="sng" algn="ctr">
-                      <a:solidFill>
-                        <a:schemeClr val="tx1"/>
-                      </a:solidFill>
-                      <a:prstDash val="solid"/>
-                      <a:round/>
-                      <a:headEnd type="none" w="med" len="med"/>
-                      <a:tailEnd type="none" w="med" len="med"/>
-                    </a:lnL>
-                    <a:lnR w="12700" cmpd="sng">
-                      <a:noFill/>
-                    </a:lnR>
-                    <a:lnT w="12700" cmpd="sng">
-                      <a:noFill/>
-                    </a:lnT>
-                    <a:lnB w="12700" cmpd="sng">
-                      <a:noFill/>
-                    </a:lnB>
-                    <a:lnTlToBr w="12700" cmpd="sng">
-                      <a:noFill/>
-                      <a:prstDash val="solid"/>
-                    </a:lnTlToBr>
-                    <a:lnBlToTr w="12700" cmpd="sng">
-                      <a:noFill/>
-                      <a:prstDash val="solid"/>
-                    </a:lnBlToTr>
-                  </a:tcPr>
-                </a:tc>
-                <a:tc>
-                  <a:txBody>
-                    <a:bodyPr/>
-                    <a:lstStyle/>
-                    <a:p>
-                      <a:pPr algn="ctr"/>
-                      <a:endParaRPr lang="en-US" sz="1050" dirty="0"/>
-                    </a:p>
-                  </a:txBody>
-                  <a:tcPr marL="79295" marR="79295" marT="39648" marB="39648" anchor="ctr">
-                    <a:lnL w="12700" cmpd="sng">
-                      <a:noFill/>
-                    </a:lnL>
-                    <a:lnR w="12700" cmpd="sng">
-                      <a:noFill/>
-                    </a:lnR>
-                    <a:lnT w="12700" cmpd="sng">
-                      <a:noFill/>
-                    </a:lnT>
-                    <a:lnB w="12700" cmpd="sng">
-                      <a:noFill/>
-                    </a:lnB>
-                    <a:lnTlToBr w="12700" cmpd="sng">
-                      <a:noFill/>
-                      <a:prstDash val="solid"/>
-                    </a:lnTlToBr>
-                    <a:lnBlToTr w="12700" cmpd="sng">
-                      <a:noFill/>
-                      <a:prstDash val="solid"/>
-                    </a:lnBlToTr>
-                  </a:tcPr>
-                </a:tc>
-                <a:tc>
-                  <a:txBody>
-                    <a:bodyPr/>
-                    <a:lstStyle/>
-                    <a:p>
-                      <a:pPr algn="ctr"/>
-                      <a:endParaRPr lang="en-US" sz="1800"/>
-                    </a:p>
-                  </a:txBody>
-                  <a:tcPr marL="79295" marR="79295" marT="39648" marB="39648" anchor="ctr">
-                    <a:lnL w="12700" cmpd="sng">
-                      <a:noFill/>
-                    </a:lnL>
-                    <a:lnR w="12700" cap="flat" cmpd="sng" algn="ctr">
-                      <a:solidFill>
-                        <a:schemeClr val="tx1"/>
-                      </a:solidFill>
-                      <a:prstDash val="solid"/>
-                      <a:round/>
-                      <a:headEnd type="none" w="med" len="med"/>
-                      <a:tailEnd type="none" w="med" len="med"/>
-                    </a:lnR>
-                    <a:lnT w="12700" cmpd="sng">
-                      <a:noFill/>
-                    </a:lnT>
-                    <a:lnB w="12700" cmpd="sng">
-                      <a:noFill/>
-                    </a:lnB>
-                    <a:lnTlToBr w="12700" cmpd="sng">
-                      <a:noFill/>
-                      <a:prstDash val="solid"/>
-                    </a:lnTlToBr>
-                    <a:lnBlToTr w="12700" cmpd="sng">
-                      <a:noFill/>
-                      <a:prstDash val="solid"/>
-                    </a:lnBlToTr>
-                  </a:tcPr>
-                </a:tc>
-                <a:tc>
-                  <a:txBody>
-                    <a:bodyPr/>
-                    <a:lstStyle/>
-                    <a:p>
-                      <a:pPr algn="ctr"/>
-                      <a:r>
-                        <a:rPr lang="en-US" sz="1050" dirty="0"/>
-                        <a:t>118 provided data</a:t>
-                      </a:r>
-                    </a:p>
-                  </a:txBody>
-                  <a:tcPr marL="79295" marR="79295" marT="39648" marB="39648" anchor="ctr">
-                    <a:lnL w="12700" cap="flat" cmpd="sng" algn="ctr">
-                      <a:solidFill>
-                        <a:schemeClr val="tx1"/>
-                      </a:solidFill>
-                      <a:prstDash val="solid"/>
-                      <a:round/>
-                      <a:headEnd type="none" w="med" len="med"/>
-                      <a:tailEnd type="none" w="med" len="med"/>
-                    </a:lnL>
-                    <a:lnR w="12700" cap="flat" cmpd="sng" algn="ctr">
-                      <a:solidFill>
-                        <a:schemeClr val="tx1"/>
-                      </a:solidFill>
-                      <a:prstDash val="solid"/>
-                      <a:round/>
-                      <a:headEnd type="none" w="med" len="med"/>
-                      <a:tailEnd type="none" w="med" len="med"/>
-                    </a:lnR>
-                    <a:lnT w="12700" cap="flat" cmpd="sng" algn="ctr">
-                      <a:solidFill>
-                        <a:schemeClr val="tx1"/>
-                      </a:solidFill>
-                      <a:prstDash val="solid"/>
-                      <a:round/>
-                      <a:headEnd type="none" w="med" len="med"/>
-                      <a:tailEnd type="none" w="med" len="med"/>
-                    </a:lnT>
-                    <a:lnB w="12700" cap="flat" cmpd="sng" algn="ctr">
-                      <a:solidFill>
-                        <a:schemeClr val="tx1"/>
-                      </a:solidFill>
-                      <a:prstDash val="solid"/>
-                      <a:round/>
-                      <a:headEnd type="none" w="med" len="med"/>
-                      <a:tailEnd type="none" w="med" len="med"/>
-                    </a:lnB>
-                    <a:lnTlToBr w="12700" cmpd="sng">
-                      <a:noFill/>
-                      <a:prstDash val="solid"/>
-                    </a:lnTlToBr>
-                    <a:lnBlToTr w="12700" cmpd="sng">
-                      <a:noFill/>
-                      <a:prstDash val="solid"/>
-                    </a:lnBlToTr>
-                  </a:tcPr>
-                </a:tc>
-                <a:tc>
-                  <a:txBody>
-                    <a:bodyPr/>
-                    <a:lstStyle/>
-                    <a:p>
-                      <a:pPr algn="ctr"/>
-                      <a:r>
-                        <a:rPr lang="en-US" sz="1800" dirty="0"/>
-                        <a:t>→</a:t>
-                      </a:r>
-                    </a:p>
-                  </a:txBody>
-                  <a:tcPr marL="79295" marR="79295" marT="39648" marB="39648" anchor="ctr">
-                    <a:lnL w="12700" cap="flat" cmpd="sng" algn="ctr">
-                      <a:solidFill>
-                        <a:schemeClr val="tx1"/>
-                      </a:solidFill>
-                      <a:prstDash val="solid"/>
-                      <a:round/>
-                      <a:headEnd type="none" w="med" len="med"/>
-                      <a:tailEnd type="none" w="med" len="med"/>
-                    </a:lnL>
-                    <a:lnR w="12700" cap="flat" cmpd="sng" algn="ctr">
-                      <a:solidFill>
-                        <a:schemeClr val="tx1"/>
-                      </a:solidFill>
-                      <a:prstDash val="solid"/>
-                      <a:round/>
-                      <a:headEnd type="none" w="med" len="med"/>
-                      <a:tailEnd type="none" w="med" len="med"/>
-                    </a:lnR>
-                    <a:lnT w="12700" cmpd="sng">
-                      <a:noFill/>
-                    </a:lnT>
-                    <a:lnB w="12700" cmpd="sng">
-                      <a:noFill/>
-                    </a:lnB>
-                    <a:lnTlToBr w="12700" cmpd="sng">
-                      <a:noFill/>
-                      <a:prstDash val="solid"/>
-                    </a:lnTlToBr>
-                    <a:lnBlToTr w="12700" cmpd="sng">
-                      <a:noFill/>
-                      <a:prstDash val="solid"/>
-                    </a:lnBlToTr>
-                  </a:tcPr>
-                </a:tc>
-                <a:tc vMerge="1">
-                  <a:txBody>
-                    <a:bodyPr/>
-                    <a:lstStyle/>
-                    <a:p>
-                      <a:pPr algn="ctr"/>
-                      <a:endParaRPr lang="en-US" sz="800" dirty="0"/>
-                    </a:p>
-                  </a:txBody>
-                  <a:tcPr marL="79295" marR="79295" marT="39648" marB="39648" anchor="ctr"/>
-                </a:tc>
-                <a:tc>
-                  <a:txBody>
-                    <a:bodyPr/>
-                    <a:lstStyle/>
-                    <a:p>
-                      <a:pPr algn="ctr"/>
-                      <a:endParaRPr lang="en-US" sz="1050" dirty="0"/>
-                    </a:p>
-                  </a:txBody>
-                  <a:tcPr marL="79295" marR="79295" marT="39648" marB="39648" anchor="ctr">
-                    <a:lnL w="12700" cap="flat" cmpd="sng" algn="ctr">
-                      <a:solidFill>
-                        <a:schemeClr val="tx1"/>
-                      </a:solidFill>
-                      <a:prstDash val="solid"/>
-                      <a:round/>
-                      <a:headEnd type="none" w="med" len="med"/>
-                      <a:tailEnd type="none" w="med" len="med"/>
-                    </a:lnL>
-                    <a:lnR w="12700" cmpd="sng">
-                      <a:noFill/>
-                    </a:lnR>
-                    <a:lnT w="12700" cmpd="sng">
-                      <a:noFill/>
-                    </a:lnT>
-                    <a:lnB w="12700" cmpd="sng">
-                      <a:noFill/>
-                    </a:lnB>
-                    <a:lnTlToBr w="12700" cmpd="sng">
-                      <a:noFill/>
-                      <a:prstDash val="solid"/>
-                    </a:lnTlToBr>
-                    <a:lnBlToTr w="12700" cmpd="sng">
-                      <a:noFill/>
-                      <a:prstDash val="solid"/>
-                    </a:lnBlToTr>
-                  </a:tcPr>
-                </a:tc>
-                <a:extLst>
-                  <a:ext uri="{0D108BD9-81ED-4DB2-BD59-A6C34878D82A}">
-                    <a16:rowId xmlns:a16="http://schemas.microsoft.com/office/drawing/2014/main" val="637476808"/>
-                  </a:ext>
-                </a:extLst>
-              </a:tr>
-              <a:tr h="145229">
-                <a:tc vMerge="1">
-                  <a:txBody>
-                    <a:bodyPr/>
-                    <a:lstStyle/>
-                    <a:p>
-                      <a:pPr algn="ctr"/>
-                      <a:endParaRPr lang="en-US" sz="1400" dirty="0"/>
-                    </a:p>
-                  </a:txBody>
-                  <a:tcPr marL="79295" marR="79295" marT="39648" marB="39648" vert="vert270" anchor="ctr">
-                    <a:lnL w="12700" cap="flat" cmpd="sng" algn="ctr">
-                      <a:solidFill>
-                        <a:schemeClr val="tx1"/>
-                      </a:solidFill>
-                      <a:prstDash val="solid"/>
-                      <a:round/>
-                      <a:headEnd type="none" w="med" len="med"/>
-                      <a:tailEnd type="none" w="med" len="med"/>
-                    </a:lnL>
-                    <a:lnR w="12700" cap="flat" cmpd="sng" algn="ctr">
-                      <a:solidFill>
-                        <a:schemeClr val="tx1"/>
-                      </a:solidFill>
-                      <a:prstDash val="solid"/>
-                      <a:round/>
-                      <a:headEnd type="none" w="med" len="med"/>
-                      <a:tailEnd type="none" w="med" len="med"/>
-                    </a:lnR>
-                    <a:lnT w="12700" cap="flat" cmpd="sng" algn="ctr">
-                      <a:solidFill>
-                        <a:schemeClr val="tx1"/>
-                      </a:solidFill>
-                      <a:prstDash val="solid"/>
-                      <a:round/>
-                      <a:headEnd type="none" w="med" len="med"/>
-                      <a:tailEnd type="none" w="med" len="med"/>
-                    </a:lnT>
-                    <a:lnB w="12700" cap="flat" cmpd="sng" algn="ctr">
-                      <a:solidFill>
-                        <a:schemeClr val="tx1"/>
-                      </a:solidFill>
-                      <a:prstDash val="solid"/>
-                      <a:round/>
-                      <a:headEnd type="none" w="med" len="med"/>
-                      <a:tailEnd type="none" w="med" len="med"/>
-                    </a:lnB>
-                    <a:lnTlToBr w="12700" cmpd="sng">
-                      <a:noFill/>
-                      <a:prstDash val="solid"/>
-                    </a:lnTlToBr>
-                    <a:lnBlToTr w="12700" cmpd="sng">
-                      <a:noFill/>
-                      <a:prstDash val="solid"/>
-                    </a:lnBlToTr>
-                  </a:tcPr>
-                </a:tc>
-                <a:tc rowSpan="2">
-                  <a:txBody>
-                    <a:bodyPr/>
-                    <a:lstStyle/>
-                    <a:p>
-                      <a:pPr algn="ctr"/>
-                      <a:endParaRPr lang="en-US" sz="1800" dirty="0"/>
-                    </a:p>
-                  </a:txBody>
-                  <a:tcPr marL="79295" marR="79295" marT="39648" marB="39648" anchor="ctr">
-                    <a:lnL w="12700" cap="flat" cmpd="sng" algn="ctr">
-                      <a:solidFill>
-                        <a:schemeClr val="tx1"/>
-                      </a:solidFill>
-                      <a:prstDash val="solid"/>
-                      <a:round/>
-                      <a:headEnd type="none" w="med" len="med"/>
-                      <a:tailEnd type="none" w="med" len="med"/>
-                    </a:lnL>
-                    <a:lnR w="12700" cmpd="sng">
-                      <a:noFill/>
-                    </a:lnR>
-                    <a:lnT w="12700" cmpd="sng">
-                      <a:noFill/>
-                    </a:lnT>
-                    <a:lnB w="12700" cmpd="sng">
-                      <a:noFill/>
-                    </a:lnB>
-                    <a:lnTlToBr w="12700" cmpd="sng">
-                      <a:noFill/>
-                      <a:prstDash val="solid"/>
-                    </a:lnTlToBr>
-                    <a:lnBlToTr w="12700" cmpd="sng">
-                      <a:noFill/>
-                      <a:prstDash val="solid"/>
-                    </a:lnBlToTr>
-                  </a:tcPr>
-                </a:tc>
-                <a:tc rowSpan="2">
-                  <a:txBody>
-                    <a:bodyPr/>
-                    <a:lstStyle/>
-                    <a:p>
-                      <a:pPr algn="ctr"/>
-                      <a:endParaRPr lang="en-US" sz="1800" dirty="0"/>
-                    </a:p>
-                  </a:txBody>
-                  <a:tcPr marL="79295" marR="79295" marT="39648" marB="39648" anchor="ctr">
-                    <a:lnL w="12700" cmpd="sng">
-                      <a:noFill/>
-                    </a:lnL>
-                    <a:lnR w="12700" cmpd="sng">
-                      <a:noFill/>
-                    </a:lnR>
                     <a:lnT w="12700" cmpd="sng">
                       <a:noFill/>
                     </a:lnT>
@@ -7995,18 +8139,6 @@
                     <a:lstStyle/>
                     <a:p>
                       <a:pPr algn="ctr"/>
-                      <a:r>
-                        <a:rPr lang="en-US" sz="1800" kern="1200" dirty="0">
-                          <a:solidFill>
-                            <a:schemeClr val="tx1"/>
-                          </a:solidFill>
-                          <a:effectLst/>
-                          <a:latin typeface="+mn-lt"/>
-                          <a:ea typeface="+mn-ea"/>
-                          <a:cs typeface="+mn-cs"/>
-                        </a:rPr>
-                        <a:t>↓</a:t>
-                      </a:r>
                       <a:endParaRPr lang="en-US" sz="1800" dirty="0"/>
                     </a:p>
                   </a:txBody>
@@ -8051,18 +8183,6 @@
                     <a:lstStyle/>
                     <a:p>
                       <a:pPr algn="ctr"/>
-                      <a:r>
-                        <a:rPr lang="en-US" sz="1800" kern="1200" dirty="0">
-                          <a:solidFill>
-                            <a:schemeClr val="tx1"/>
-                          </a:solidFill>
-                          <a:effectLst/>
-                          <a:latin typeface="+mn-lt"/>
-                          <a:ea typeface="+mn-ea"/>
-                          <a:cs typeface="+mn-cs"/>
-                        </a:rPr>
-                        <a:t>↘</a:t>
-                      </a:r>
                       <a:endParaRPr lang="en-US" sz="1800" dirty="0"/>
                     </a:p>
                   </a:txBody>
@@ -8468,7 +8588,10 @@
                     <a:lstStyle/>
                     <a:p>
                       <a:pPr algn="ctr"/>
-                      <a:endParaRPr lang="en-US" sz="1800" dirty="0"/>
+                      <a:r>
+                        <a:rPr lang="en-US" sz="1800" dirty="0"/>
+                        <a:t>→</a:t>
+                      </a:r>
                     </a:p>
                   </a:txBody>
                   <a:tcPr marL="79295" marR="79295" marT="39648" marB="39648" anchor="ctr">
@@ -8571,7 +8694,10 @@
                     <a:lstStyle/>
                     <a:p>
                       <a:pPr algn="ctr"/>
-                      <a:endParaRPr lang="en-US" sz="1800" dirty="0"/>
+                      <a:r>
+                        <a:rPr lang="en-US" sz="1800" dirty="0"/>
+                        <a:t>→</a:t>
+                      </a:r>
                     </a:p>
                   </a:txBody>
                   <a:tcPr marL="79295" marR="79295" marT="39648" marB="39648" anchor="ctr">
@@ -8746,6 +8872,45 @@
           </a:graphicData>
         </a:graphic>
       </p:graphicFrame>
+      <p:cxnSp>
+        <p:nvCxnSpPr>
+          <p:cNvPr id="19" name="Gerader Verbinder 18">
+            <a:extLst>
+              <a:ext uri="{FF2B5EF4-FFF2-40B4-BE49-F238E27FC236}">
+                <a16:creationId xmlns:a16="http://schemas.microsoft.com/office/drawing/2014/main" id="{BCF36EE5-077D-44D7-AB54-793E45F311D4}"/>
+              </a:ext>
+            </a:extLst>
+          </p:cNvPr>
+          <p:cNvCxnSpPr>
+            <a:cxnSpLocks/>
+          </p:cNvCxnSpPr>
+          <p:nvPr/>
+        </p:nvCxnSpPr>
+        <p:spPr>
+          <a:xfrm>
+            <a:off x="1487054" y="3962400"/>
+            <a:ext cx="0" cy="2262909"/>
+          </a:xfrm>
+          <a:prstGeom prst="line">
+            <a:avLst/>
+          </a:prstGeom>
+          <a:ln w="19050"/>
+        </p:spPr>
+        <p:style>
+          <a:lnRef idx="1">
+            <a:schemeClr val="dk1"/>
+          </a:lnRef>
+          <a:fillRef idx="0">
+            <a:schemeClr val="dk1"/>
+          </a:fillRef>
+          <a:effectRef idx="0">
+            <a:schemeClr val="dk1"/>
+          </a:effectRef>
+          <a:fontRef idx="minor">
+            <a:schemeClr val="tx1"/>
+          </a:fontRef>
+        </p:style>
+      </p:cxnSp>
     </p:spTree>
     <p:extLst>
       <p:ext uri="{BB962C8B-B14F-4D97-AF65-F5344CB8AC3E}">

</xml_diff>